<commit_message>
re-added design spec and started on presensation
</commit_message>
<xml_diff>
--- a/presentation_material/powerpoint.pptx
+++ b/presentation_material/powerpoint.pptx
@@ -2,18 +2,24 @@
 <file path=ppt/presentation.xml><?xml version="1.0" encoding="utf-8"?>
 <p:presentation xmlns:a="http://schemas.openxmlformats.org/drawingml/2006/main" xmlns:r="http://schemas.openxmlformats.org/officeDocument/2006/relationships" xmlns:p="http://schemas.openxmlformats.org/presentationml/2006/main" saveSubsetFonts="1">
   <p:sldMasterIdLst>
-    <p:sldMasterId id="2147483648" r:id="rId1"/>
+    <p:sldMasterId id="2147483660" r:id="rId1"/>
   </p:sldMasterIdLst>
   <p:sldIdLst>
-    <p:sldId id="256" r:id="rId2"/>
+    <p:sldId id="257" r:id="rId2"/>
+    <p:sldId id="256" r:id="rId3"/>
+    <p:sldId id="262" r:id="rId4"/>
+    <p:sldId id="258" r:id="rId5"/>
+    <p:sldId id="259" r:id="rId6"/>
+    <p:sldId id="260" r:id="rId7"/>
+    <p:sldId id="261" r:id="rId8"/>
   </p:sldIdLst>
-  <p:sldSz cx="12192000" cy="6858000"/>
+  <p:sldSz cx="9144000" cy="6858000" type="screen4x3"/>
   <p:notesSz cx="6858000" cy="9144000"/>
   <p:defaultTextStyle>
     <a:defPPr>
       <a:defRPr lang="en-US"/>
     </a:defPPr>
-    <a:lvl1pPr marL="0" algn="l" defTabSz="914400" rtl="0" eaLnBrk="1" latinLnBrk="0" hangingPunct="1">
+    <a:lvl1pPr marL="0" algn="l" defTabSz="457200" rtl="0" eaLnBrk="1" latinLnBrk="0" hangingPunct="1">
       <a:defRPr sz="1800" kern="1200">
         <a:solidFill>
           <a:schemeClr val="tx1"/>
@@ -23,7 +29,7 @@
         <a:cs typeface="+mn-cs"/>
       </a:defRPr>
     </a:lvl1pPr>
-    <a:lvl2pPr marL="457200" algn="l" defTabSz="914400" rtl="0" eaLnBrk="1" latinLnBrk="0" hangingPunct="1">
+    <a:lvl2pPr marL="457200" algn="l" defTabSz="457200" rtl="0" eaLnBrk="1" latinLnBrk="0" hangingPunct="1">
       <a:defRPr sz="1800" kern="1200">
         <a:solidFill>
           <a:schemeClr val="tx1"/>
@@ -33,7 +39,7 @@
         <a:cs typeface="+mn-cs"/>
       </a:defRPr>
     </a:lvl2pPr>
-    <a:lvl3pPr marL="914400" algn="l" defTabSz="914400" rtl="0" eaLnBrk="1" latinLnBrk="0" hangingPunct="1">
+    <a:lvl3pPr marL="914400" algn="l" defTabSz="457200" rtl="0" eaLnBrk="1" latinLnBrk="0" hangingPunct="1">
       <a:defRPr sz="1800" kern="1200">
         <a:solidFill>
           <a:schemeClr val="tx1"/>
@@ -43,7 +49,7 @@
         <a:cs typeface="+mn-cs"/>
       </a:defRPr>
     </a:lvl3pPr>
-    <a:lvl4pPr marL="1371600" algn="l" defTabSz="914400" rtl="0" eaLnBrk="1" latinLnBrk="0" hangingPunct="1">
+    <a:lvl4pPr marL="1371600" algn="l" defTabSz="457200" rtl="0" eaLnBrk="1" latinLnBrk="0" hangingPunct="1">
       <a:defRPr sz="1800" kern="1200">
         <a:solidFill>
           <a:schemeClr val="tx1"/>
@@ -53,7 +59,7 @@
         <a:cs typeface="+mn-cs"/>
       </a:defRPr>
     </a:lvl4pPr>
-    <a:lvl5pPr marL="1828800" algn="l" defTabSz="914400" rtl="0" eaLnBrk="1" latinLnBrk="0" hangingPunct="1">
+    <a:lvl5pPr marL="1828800" algn="l" defTabSz="457200" rtl="0" eaLnBrk="1" latinLnBrk="0" hangingPunct="1">
       <a:defRPr sz="1800" kern="1200">
         <a:solidFill>
           <a:schemeClr val="tx1"/>
@@ -63,7 +69,7 @@
         <a:cs typeface="+mn-cs"/>
       </a:defRPr>
     </a:lvl5pPr>
-    <a:lvl6pPr marL="2286000" algn="l" defTabSz="914400" rtl="0" eaLnBrk="1" latinLnBrk="0" hangingPunct="1">
+    <a:lvl6pPr marL="2286000" algn="l" defTabSz="457200" rtl="0" eaLnBrk="1" latinLnBrk="0" hangingPunct="1">
       <a:defRPr sz="1800" kern="1200">
         <a:solidFill>
           <a:schemeClr val="tx1"/>
@@ -73,7 +79,7 @@
         <a:cs typeface="+mn-cs"/>
       </a:defRPr>
     </a:lvl6pPr>
-    <a:lvl7pPr marL="2743200" algn="l" defTabSz="914400" rtl="0" eaLnBrk="1" latinLnBrk="0" hangingPunct="1">
+    <a:lvl7pPr marL="2743200" algn="l" defTabSz="457200" rtl="0" eaLnBrk="1" latinLnBrk="0" hangingPunct="1">
       <a:defRPr sz="1800" kern="1200">
         <a:solidFill>
           <a:schemeClr val="tx1"/>
@@ -83,7 +89,7 @@
         <a:cs typeface="+mn-cs"/>
       </a:defRPr>
     </a:lvl7pPr>
-    <a:lvl8pPr marL="3200400" algn="l" defTabSz="914400" rtl="0" eaLnBrk="1" latinLnBrk="0" hangingPunct="1">
+    <a:lvl8pPr marL="3200400" algn="l" defTabSz="457200" rtl="0" eaLnBrk="1" latinLnBrk="0" hangingPunct="1">
       <a:defRPr sz="1800" kern="1200">
         <a:solidFill>
           <a:schemeClr val="tx1"/>
@@ -93,7 +99,7 @@
         <a:cs typeface="+mn-cs"/>
       </a:defRPr>
     </a:lvl8pPr>
-    <a:lvl9pPr marL="3657600" algn="l" defTabSz="914400" rtl="0" eaLnBrk="1" latinLnBrk="0" hangingPunct="1">
+    <a:lvl9pPr marL="3657600" algn="l" defTabSz="457200" rtl="0" eaLnBrk="1" latinLnBrk="0" hangingPunct="1">
       <a:defRPr sz="1800" kern="1200">
         <a:solidFill>
           <a:schemeClr val="tx1"/>
@@ -104,6 +110,11 @@
       </a:defRPr>
     </a:lvl9pPr>
   </p:defaultTextStyle>
+  <p:extLst>
+    <p:ext uri="{EFAFB233-063F-42B5-8137-9DF3F51BA10A}">
+      <p15:sldGuideLst xmlns:p15="http://schemas.microsoft.com/office/powerpoint/2012/main"/>
+    </p:ext>
+  </p:extLst>
 </p:presentation>
 </file>
 
@@ -136,8 +147,8 @@
         </p:nvSpPr>
         <p:spPr>
           <a:xfrm>
-            <a:off x="1524000" y="1122363"/>
-            <a:ext cx="9144000" cy="2387600"/>
+            <a:off x="685800" y="1122363"/>
+            <a:ext cx="7772400" cy="2387600"/>
           </a:xfrm>
         </p:spPr>
         <p:txBody>
@@ -152,7 +163,7 @@
               <a:rPr lang="en-US"/>
               <a:t>Click to edit Master title style</a:t>
             </a:r>
-            <a:endParaRPr lang="en-GB"/>
+            <a:endParaRPr lang="en-US" dirty="0"/>
           </a:p>
         </p:txBody>
       </p:sp>
@@ -168,8 +179,8 @@
         </p:nvSpPr>
         <p:spPr>
           <a:xfrm>
-            <a:off x="1524000" y="3602038"/>
-            <a:ext cx="9144000" cy="1655762"/>
+            <a:off x="1143000" y="3602038"/>
+            <a:ext cx="6858000" cy="1655762"/>
           </a:xfrm>
         </p:spPr>
         <p:txBody>
@@ -217,7 +228,7 @@
               <a:rPr lang="en-US"/>
               <a:t>Click to edit Master subtitle style</a:t>
             </a:r>
-            <a:endParaRPr lang="en-GB"/>
+            <a:endParaRPr lang="en-US" dirty="0"/>
           </a:p>
         </p:txBody>
       </p:sp>
@@ -289,7 +300,7 @@
     </p:spTree>
     <p:extLst>
       <p:ext uri="{BB962C8B-B14F-4D97-AF65-F5344CB8AC3E}">
-        <p14:creationId xmlns:p14="http://schemas.microsoft.com/office/powerpoint/2010/main" val="3442916821"/>
+        <p14:creationId xmlns:p14="http://schemas.microsoft.com/office/powerpoint/2010/main" val="2406055102"/>
       </p:ext>
     </p:extLst>
   </p:cSld>
@@ -335,7 +346,7 @@
               <a:rPr lang="en-US"/>
               <a:t>Click to edit Master title style</a:t>
             </a:r>
-            <a:endParaRPr lang="en-GB"/>
+            <a:endParaRPr lang="en-US" dirty="0"/>
           </a:p>
         </p:txBody>
       </p:sp>
@@ -387,7 +398,7 @@
               <a:rPr lang="en-US"/>
               <a:t>Fifth level</a:t>
             </a:r>
-            <a:endParaRPr lang="en-GB"/>
+            <a:endParaRPr lang="en-US" dirty="0"/>
           </a:p>
         </p:txBody>
       </p:sp>
@@ -459,7 +470,7 @@
     </p:spTree>
     <p:extLst>
       <p:ext uri="{BB962C8B-B14F-4D97-AF65-F5344CB8AC3E}">
-        <p14:creationId xmlns:p14="http://schemas.microsoft.com/office/powerpoint/2010/main" val="1548039252"/>
+        <p14:creationId xmlns:p14="http://schemas.microsoft.com/office/powerpoint/2010/main" val="1733033614"/>
       </p:ext>
     </p:extLst>
   </p:cSld>
@@ -498,8 +509,8 @@
         </p:nvSpPr>
         <p:spPr>
           <a:xfrm>
-            <a:off x="8724900" y="365125"/>
-            <a:ext cx="2628900" cy="5811838"/>
+            <a:off x="6543675" y="365125"/>
+            <a:ext cx="1971675" cy="5811838"/>
           </a:xfrm>
         </p:spPr>
         <p:txBody>
@@ -510,7 +521,7 @@
               <a:rPr lang="en-US"/>
               <a:t>Click to edit Master title style</a:t>
             </a:r>
-            <a:endParaRPr lang="en-GB"/>
+            <a:endParaRPr lang="en-US" dirty="0"/>
           </a:p>
         </p:txBody>
       </p:sp>
@@ -526,8 +537,8 @@
         </p:nvSpPr>
         <p:spPr>
           <a:xfrm>
-            <a:off x="838200" y="365125"/>
-            <a:ext cx="7734300" cy="5811838"/>
+            <a:off x="628650" y="365125"/>
+            <a:ext cx="5800725" cy="5811838"/>
           </a:xfrm>
         </p:spPr>
         <p:txBody>
@@ -567,7 +578,7 @@
               <a:rPr lang="en-US"/>
               <a:t>Fifth level</a:t>
             </a:r>
-            <a:endParaRPr lang="en-GB"/>
+            <a:endParaRPr lang="en-US" dirty="0"/>
           </a:p>
         </p:txBody>
       </p:sp>
@@ -639,7 +650,7 @@
     </p:spTree>
     <p:extLst>
       <p:ext uri="{BB962C8B-B14F-4D97-AF65-F5344CB8AC3E}">
-        <p14:creationId xmlns:p14="http://schemas.microsoft.com/office/powerpoint/2010/main" val="1203707140"/>
+        <p14:creationId xmlns:p14="http://schemas.microsoft.com/office/powerpoint/2010/main" val="172146855"/>
       </p:ext>
     </p:extLst>
   </p:cSld>
@@ -685,7 +696,7 @@
               <a:rPr lang="en-US"/>
               <a:t>Click to edit Master title style</a:t>
             </a:r>
-            <a:endParaRPr lang="en-GB"/>
+            <a:endParaRPr lang="en-US" dirty="0"/>
           </a:p>
         </p:txBody>
       </p:sp>
@@ -737,7 +748,7 @@
               <a:rPr lang="en-US"/>
               <a:t>Fifth level</a:t>
             </a:r>
-            <a:endParaRPr lang="en-GB"/>
+            <a:endParaRPr lang="en-US" dirty="0"/>
           </a:p>
         </p:txBody>
       </p:sp>
@@ -809,7 +820,7 @@
     </p:spTree>
     <p:extLst>
       <p:ext uri="{BB962C8B-B14F-4D97-AF65-F5344CB8AC3E}">
-        <p14:creationId xmlns:p14="http://schemas.microsoft.com/office/powerpoint/2010/main" val="652284291"/>
+        <p14:creationId xmlns:p14="http://schemas.microsoft.com/office/powerpoint/2010/main" val="1859307931"/>
       </p:ext>
     </p:extLst>
   </p:cSld>
@@ -848,8 +859,8 @@
         </p:nvSpPr>
         <p:spPr>
           <a:xfrm>
-            <a:off x="831850" y="1709738"/>
-            <a:ext cx="10515600" cy="2852737"/>
+            <a:off x="623888" y="1709739"/>
+            <a:ext cx="7886700" cy="2852737"/>
           </a:xfrm>
         </p:spPr>
         <p:txBody>
@@ -864,7 +875,7 @@
               <a:rPr lang="en-US"/>
               <a:t>Click to edit Master title style</a:t>
             </a:r>
-            <a:endParaRPr lang="en-GB"/>
+            <a:endParaRPr lang="en-US" dirty="0"/>
           </a:p>
         </p:txBody>
       </p:sp>
@@ -880,8 +891,8 @@
         </p:nvSpPr>
         <p:spPr>
           <a:xfrm>
-            <a:off x="831850" y="4589463"/>
-            <a:ext cx="10515600" cy="1500187"/>
+            <a:off x="623888" y="4589464"/>
+            <a:ext cx="7886700" cy="1500187"/>
           </a:xfrm>
         </p:spPr>
         <p:txBody>
@@ -891,9 +902,7 @@
               <a:buNone/>
               <a:defRPr sz="2400">
                 <a:solidFill>
-                  <a:schemeClr val="tx1">
-                    <a:tint val="75000"/>
-                  </a:schemeClr>
+                  <a:schemeClr val="tx1"/>
                 </a:solidFill>
               </a:defRPr>
             </a:lvl1pPr>
@@ -1055,7 +1064,7 @@
     </p:spTree>
     <p:extLst>
       <p:ext uri="{BB962C8B-B14F-4D97-AF65-F5344CB8AC3E}">
-        <p14:creationId xmlns:p14="http://schemas.microsoft.com/office/powerpoint/2010/main" val="902726886"/>
+        <p14:creationId xmlns:p14="http://schemas.microsoft.com/office/powerpoint/2010/main" val="2365674127"/>
       </p:ext>
     </p:extLst>
   </p:cSld>
@@ -1101,7 +1110,7 @@
               <a:rPr lang="en-US"/>
               <a:t>Click to edit Master title style</a:t>
             </a:r>
-            <a:endParaRPr lang="en-GB"/>
+            <a:endParaRPr lang="en-US" dirty="0"/>
           </a:p>
         </p:txBody>
       </p:sp>
@@ -1117,8 +1126,8 @@
         </p:nvSpPr>
         <p:spPr>
           <a:xfrm>
-            <a:off x="838200" y="1825625"/>
-            <a:ext cx="5181600" cy="4351338"/>
+            <a:off x="628650" y="1825625"/>
+            <a:ext cx="3886200" cy="4351338"/>
           </a:xfrm>
         </p:spPr>
         <p:txBody>
@@ -1158,7 +1167,7 @@
               <a:rPr lang="en-US"/>
               <a:t>Fifth level</a:t>
             </a:r>
-            <a:endParaRPr lang="en-GB"/>
+            <a:endParaRPr lang="en-US" dirty="0"/>
           </a:p>
         </p:txBody>
       </p:sp>
@@ -1174,8 +1183,8 @@
         </p:nvSpPr>
         <p:spPr>
           <a:xfrm>
-            <a:off x="6172200" y="1825625"/>
-            <a:ext cx="5181600" cy="4351338"/>
+            <a:off x="4629150" y="1825625"/>
+            <a:ext cx="3886200" cy="4351338"/>
           </a:xfrm>
         </p:spPr>
         <p:txBody>
@@ -1215,7 +1224,7 @@
               <a:rPr lang="en-US"/>
               <a:t>Fifth level</a:t>
             </a:r>
-            <a:endParaRPr lang="en-GB"/>
+            <a:endParaRPr lang="en-US" dirty="0"/>
           </a:p>
         </p:txBody>
       </p:sp>
@@ -1287,7 +1296,7 @@
     </p:spTree>
     <p:extLst>
       <p:ext uri="{BB962C8B-B14F-4D97-AF65-F5344CB8AC3E}">
-        <p14:creationId xmlns:p14="http://schemas.microsoft.com/office/powerpoint/2010/main" val="2319322960"/>
+        <p14:creationId xmlns:p14="http://schemas.microsoft.com/office/powerpoint/2010/main" val="2042036909"/>
       </p:ext>
     </p:extLst>
   </p:cSld>
@@ -1326,8 +1335,8 @@
         </p:nvSpPr>
         <p:spPr>
           <a:xfrm>
-            <a:off x="839788" y="365125"/>
-            <a:ext cx="10515600" cy="1325563"/>
+            <a:off x="629841" y="365126"/>
+            <a:ext cx="7886700" cy="1325563"/>
           </a:xfrm>
         </p:spPr>
         <p:txBody>
@@ -1338,7 +1347,7 @@
               <a:rPr lang="en-US"/>
               <a:t>Click to edit Master title style</a:t>
             </a:r>
-            <a:endParaRPr lang="en-GB"/>
+            <a:endParaRPr lang="en-US" dirty="0"/>
           </a:p>
         </p:txBody>
       </p:sp>
@@ -1354,8 +1363,8 @@
         </p:nvSpPr>
         <p:spPr>
           <a:xfrm>
-            <a:off x="839788" y="1681163"/>
-            <a:ext cx="5157787" cy="823912"/>
+            <a:off x="629842" y="1681163"/>
+            <a:ext cx="3868340" cy="823912"/>
           </a:xfrm>
         </p:spPr>
         <p:txBody>
@@ -1419,8 +1428,8 @@
         </p:nvSpPr>
         <p:spPr>
           <a:xfrm>
-            <a:off x="839788" y="2505075"/>
-            <a:ext cx="5157787" cy="3684588"/>
+            <a:off x="629842" y="2505075"/>
+            <a:ext cx="3868340" cy="3684588"/>
           </a:xfrm>
         </p:spPr>
         <p:txBody>
@@ -1460,7 +1469,7 @@
               <a:rPr lang="en-US"/>
               <a:t>Fifth level</a:t>
             </a:r>
-            <a:endParaRPr lang="en-GB"/>
+            <a:endParaRPr lang="en-US" dirty="0"/>
           </a:p>
         </p:txBody>
       </p:sp>
@@ -1476,8 +1485,8 @@
         </p:nvSpPr>
         <p:spPr>
           <a:xfrm>
-            <a:off x="6172200" y="1681163"/>
-            <a:ext cx="5183188" cy="823912"/>
+            <a:off x="4629150" y="1681163"/>
+            <a:ext cx="3887391" cy="823912"/>
           </a:xfrm>
         </p:spPr>
         <p:txBody>
@@ -1541,8 +1550,8 @@
         </p:nvSpPr>
         <p:spPr>
           <a:xfrm>
-            <a:off x="6172200" y="2505075"/>
-            <a:ext cx="5183188" cy="3684588"/>
+            <a:off x="4629150" y="2505075"/>
+            <a:ext cx="3887391" cy="3684588"/>
           </a:xfrm>
         </p:spPr>
         <p:txBody>
@@ -1582,7 +1591,7 @@
               <a:rPr lang="en-US"/>
               <a:t>Fifth level</a:t>
             </a:r>
-            <a:endParaRPr lang="en-GB"/>
+            <a:endParaRPr lang="en-US" dirty="0"/>
           </a:p>
         </p:txBody>
       </p:sp>
@@ -1654,7 +1663,7 @@
     </p:spTree>
     <p:extLst>
       <p:ext uri="{BB962C8B-B14F-4D97-AF65-F5344CB8AC3E}">
-        <p14:creationId xmlns:p14="http://schemas.microsoft.com/office/powerpoint/2010/main" val="3044690132"/>
+        <p14:creationId xmlns:p14="http://schemas.microsoft.com/office/powerpoint/2010/main" val="207377299"/>
       </p:ext>
     </p:extLst>
   </p:cSld>
@@ -1700,7 +1709,7 @@
               <a:rPr lang="en-US"/>
               <a:t>Click to edit Master title style</a:t>
             </a:r>
-            <a:endParaRPr lang="en-GB"/>
+            <a:endParaRPr lang="en-US" dirty="0"/>
           </a:p>
         </p:txBody>
       </p:sp>
@@ -1772,7 +1781,7 @@
     </p:spTree>
     <p:extLst>
       <p:ext uri="{BB962C8B-B14F-4D97-AF65-F5344CB8AC3E}">
-        <p14:creationId xmlns:p14="http://schemas.microsoft.com/office/powerpoint/2010/main" val="1720732623"/>
+        <p14:creationId xmlns:p14="http://schemas.microsoft.com/office/powerpoint/2010/main" val="3296456657"/>
       </p:ext>
     </p:extLst>
   </p:cSld>
@@ -1867,7 +1876,7 @@
     </p:spTree>
     <p:extLst>
       <p:ext uri="{BB962C8B-B14F-4D97-AF65-F5344CB8AC3E}">
-        <p14:creationId xmlns:p14="http://schemas.microsoft.com/office/powerpoint/2010/main" val="2596004056"/>
+        <p14:creationId xmlns:p14="http://schemas.microsoft.com/office/powerpoint/2010/main" val="4252273032"/>
       </p:ext>
     </p:extLst>
   </p:cSld>
@@ -1906,8 +1915,8 @@
         </p:nvSpPr>
         <p:spPr>
           <a:xfrm>
-            <a:off x="839788" y="457200"/>
-            <a:ext cx="3932237" cy="1600200"/>
+            <a:off x="629841" y="457200"/>
+            <a:ext cx="2949178" cy="1600200"/>
           </a:xfrm>
         </p:spPr>
         <p:txBody>
@@ -1922,7 +1931,7 @@
               <a:rPr lang="en-US"/>
               <a:t>Click to edit Master title style</a:t>
             </a:r>
-            <a:endParaRPr lang="en-GB"/>
+            <a:endParaRPr lang="en-US" dirty="0"/>
           </a:p>
         </p:txBody>
       </p:sp>
@@ -1938,8 +1947,8 @@
         </p:nvSpPr>
         <p:spPr>
           <a:xfrm>
-            <a:off x="5183188" y="987425"/>
-            <a:ext cx="6172200" cy="4873625"/>
+            <a:off x="3887391" y="987426"/>
+            <a:ext cx="4629150" cy="4873625"/>
           </a:xfrm>
         </p:spPr>
         <p:txBody>
@@ -2007,7 +2016,7 @@
               <a:rPr lang="en-US"/>
               <a:t>Fifth level</a:t>
             </a:r>
-            <a:endParaRPr lang="en-GB"/>
+            <a:endParaRPr lang="en-US" dirty="0"/>
           </a:p>
         </p:txBody>
       </p:sp>
@@ -2023,8 +2032,8 @@
         </p:nvSpPr>
         <p:spPr>
           <a:xfrm>
-            <a:off x="839788" y="2057400"/>
-            <a:ext cx="3932237" cy="3811588"/>
+            <a:off x="629841" y="2057400"/>
+            <a:ext cx="2949178" cy="3811588"/>
           </a:xfrm>
         </p:spPr>
         <p:txBody>
@@ -2144,7 +2153,7 @@
     </p:spTree>
     <p:extLst>
       <p:ext uri="{BB962C8B-B14F-4D97-AF65-F5344CB8AC3E}">
-        <p14:creationId xmlns:p14="http://schemas.microsoft.com/office/powerpoint/2010/main" val="971716813"/>
+        <p14:creationId xmlns:p14="http://schemas.microsoft.com/office/powerpoint/2010/main" val="722051621"/>
       </p:ext>
     </p:extLst>
   </p:cSld>
@@ -2183,8 +2192,8 @@
         </p:nvSpPr>
         <p:spPr>
           <a:xfrm>
-            <a:off x="839788" y="457200"/>
-            <a:ext cx="3932237" cy="1600200"/>
+            <a:off x="629841" y="457200"/>
+            <a:ext cx="2949178" cy="1600200"/>
           </a:xfrm>
         </p:spPr>
         <p:txBody>
@@ -2199,7 +2208,7 @@
               <a:rPr lang="en-US"/>
               <a:t>Click to edit Master title style</a:t>
             </a:r>
-            <a:endParaRPr lang="en-GB"/>
+            <a:endParaRPr lang="en-US" dirty="0"/>
           </a:p>
         </p:txBody>
       </p:sp>
@@ -2207,7 +2216,7 @@
         <p:nvSpPr>
           <p:cNvPr id="3" name="Picture Placeholder 2"/>
           <p:cNvSpPr>
-            <a:spLocks noGrp="1"/>
+            <a:spLocks noGrp="1" noChangeAspect="1"/>
           </p:cNvSpPr>
           <p:nvPr>
             <p:ph type="pic" idx="1"/>
@@ -2215,12 +2224,12 @@
         </p:nvSpPr>
         <p:spPr>
           <a:xfrm>
-            <a:off x="5183188" y="987425"/>
-            <a:ext cx="6172200" cy="4873625"/>
+            <a:off x="3887391" y="987426"/>
+            <a:ext cx="4629150" cy="4873625"/>
           </a:xfrm>
         </p:spPr>
         <p:txBody>
-          <a:bodyPr/>
+          <a:bodyPr anchor="t"/>
           <a:lstStyle>
             <a:lvl1pPr marL="0" indent="0">
               <a:buNone/>
@@ -2260,7 +2269,11 @@
             </a:lvl9pPr>
           </a:lstStyle>
           <a:p>
-            <a:endParaRPr lang="en-GB"/>
+            <a:r>
+              <a:rPr lang="en-US"/>
+              <a:t>Click icon to add picture</a:t>
+            </a:r>
+            <a:endParaRPr lang="en-US" dirty="0"/>
           </a:p>
         </p:txBody>
       </p:sp>
@@ -2276,8 +2289,8 @@
         </p:nvSpPr>
         <p:spPr>
           <a:xfrm>
-            <a:off x="839788" y="2057400"/>
-            <a:ext cx="3932237" cy="3811588"/>
+            <a:off x="629841" y="2057400"/>
+            <a:ext cx="2949178" cy="3811588"/>
           </a:xfrm>
         </p:spPr>
         <p:txBody>
@@ -2397,7 +2410,7 @@
     </p:spTree>
     <p:extLst>
       <p:ext uri="{BB962C8B-B14F-4D97-AF65-F5344CB8AC3E}">
-        <p14:creationId xmlns:p14="http://schemas.microsoft.com/office/powerpoint/2010/main" val="1209445962"/>
+        <p14:creationId xmlns:p14="http://schemas.microsoft.com/office/powerpoint/2010/main" val="3708252542"/>
       </p:ext>
     </p:extLst>
   </p:cSld>
@@ -2441,8 +2454,8 @@
         </p:nvSpPr>
         <p:spPr>
           <a:xfrm>
-            <a:off x="838200" y="365125"/>
-            <a:ext cx="10515600" cy="1325563"/>
+            <a:off x="628650" y="365126"/>
+            <a:ext cx="7886700" cy="1325563"/>
           </a:xfrm>
           <a:prstGeom prst="rect">
             <a:avLst/>
@@ -2458,7 +2471,7 @@
               <a:rPr lang="en-US"/>
               <a:t>Click to edit Master title style</a:t>
             </a:r>
-            <a:endParaRPr lang="en-GB"/>
+            <a:endParaRPr lang="en-US" dirty="0"/>
           </a:p>
         </p:txBody>
       </p:sp>
@@ -2474,8 +2487,8 @@
         </p:nvSpPr>
         <p:spPr>
           <a:xfrm>
-            <a:off x="838200" y="1825625"/>
-            <a:ext cx="10515600" cy="4351338"/>
+            <a:off x="628650" y="1825625"/>
+            <a:ext cx="7886700" cy="4351338"/>
           </a:xfrm>
           <a:prstGeom prst="rect">
             <a:avLst/>
@@ -2520,7 +2533,7 @@
               <a:rPr lang="en-US"/>
               <a:t>Fifth level</a:t>
             </a:r>
-            <a:endParaRPr lang="en-GB"/>
+            <a:endParaRPr lang="en-US" dirty="0"/>
           </a:p>
         </p:txBody>
       </p:sp>
@@ -2536,8 +2549,8 @@
         </p:nvSpPr>
         <p:spPr>
           <a:xfrm>
-            <a:off x="838200" y="6356350"/>
-            <a:ext cx="2743200" cy="365125"/>
+            <a:off x="628650" y="6356351"/>
+            <a:ext cx="2057400" cy="365125"/>
           </a:xfrm>
           <a:prstGeom prst="rect">
             <a:avLst/>
@@ -2577,8 +2590,8 @@
         </p:nvSpPr>
         <p:spPr>
           <a:xfrm>
-            <a:off x="4038600" y="6356350"/>
-            <a:ext cx="4114800" cy="365125"/>
+            <a:off x="3028950" y="6356351"/>
+            <a:ext cx="3086100" cy="365125"/>
           </a:xfrm>
           <a:prstGeom prst="rect">
             <a:avLst/>
@@ -2614,8 +2627,8 @@
         </p:nvSpPr>
         <p:spPr>
           <a:xfrm>
-            <a:off x="8610600" y="6356350"/>
-            <a:ext cx="2743200" cy="365125"/>
+            <a:off x="6457950" y="6356351"/>
+            <a:ext cx="2057400" cy="365125"/>
           </a:xfrm>
           <a:prstGeom prst="rect">
             <a:avLst/>
@@ -2646,23 +2659,23 @@
     </p:spTree>
     <p:extLst>
       <p:ext uri="{BB962C8B-B14F-4D97-AF65-F5344CB8AC3E}">
-        <p14:creationId xmlns:p14="http://schemas.microsoft.com/office/powerpoint/2010/main" val="2042508587"/>
+        <p14:creationId xmlns:p14="http://schemas.microsoft.com/office/powerpoint/2010/main" val="2377768637"/>
       </p:ext>
     </p:extLst>
   </p:cSld>
   <p:clrMap bg1="lt1" tx1="dk1" bg2="lt2" tx2="dk2" accent1="accent1" accent2="accent2" accent3="accent3" accent4="accent4" accent5="accent5" accent6="accent6" hlink="hlink" folHlink="folHlink"/>
   <p:sldLayoutIdLst>
-    <p:sldLayoutId id="2147483649" r:id="rId1"/>
-    <p:sldLayoutId id="2147483650" r:id="rId2"/>
-    <p:sldLayoutId id="2147483651" r:id="rId3"/>
-    <p:sldLayoutId id="2147483652" r:id="rId4"/>
-    <p:sldLayoutId id="2147483653" r:id="rId5"/>
-    <p:sldLayoutId id="2147483654" r:id="rId6"/>
-    <p:sldLayoutId id="2147483655" r:id="rId7"/>
-    <p:sldLayoutId id="2147483656" r:id="rId8"/>
-    <p:sldLayoutId id="2147483657" r:id="rId9"/>
-    <p:sldLayoutId id="2147483658" r:id="rId10"/>
-    <p:sldLayoutId id="2147483659" r:id="rId11"/>
+    <p:sldLayoutId id="2147483661" r:id="rId1"/>
+    <p:sldLayoutId id="2147483662" r:id="rId2"/>
+    <p:sldLayoutId id="2147483663" r:id="rId3"/>
+    <p:sldLayoutId id="2147483664" r:id="rId4"/>
+    <p:sldLayoutId id="2147483665" r:id="rId5"/>
+    <p:sldLayoutId id="2147483666" r:id="rId6"/>
+    <p:sldLayoutId id="2147483667" r:id="rId7"/>
+    <p:sldLayoutId id="2147483668" r:id="rId8"/>
+    <p:sldLayoutId id="2147483669" r:id="rId9"/>
+    <p:sldLayoutId id="2147483670" r:id="rId10"/>
+    <p:sldLayoutId id="2147483671" r:id="rId11"/>
   </p:sldLayoutIdLst>
   <p:txStyles>
     <p:titleStyle>
@@ -2964,33 +2977,91 @@
           <a:chExt cx="0" cy="0"/>
         </a:xfrm>
       </p:grpSpPr>
-      <p:sp>
-        <p:nvSpPr>
-          <p:cNvPr id="2" name="Title 1"/>
-          <p:cNvSpPr>
-            <a:spLocks noGrp="1"/>
-          </p:cNvSpPr>
-          <p:nvPr>
-            <p:ph type="ctrTitle"/>
-          </p:nvPr>
-        </p:nvSpPr>
+      <p:pic>
+        <p:nvPicPr>
+          <p:cNvPr id="4" name="Picture 3"/>
+          <p:cNvPicPr>
+            <a:picLocks noChangeAspect="1"/>
+          </p:cNvPicPr>
+          <p:nvPr/>
+        </p:nvPicPr>
+        <p:blipFill>
+          <a:blip r:embed="rId2">
+            <a:extLst>
+              <a:ext uri="{28A0092B-C50C-407E-A947-70E740481C1C}">
+                <a14:useLocalDpi xmlns:a14="http://schemas.microsoft.com/office/drawing/2010/main" val="0"/>
+              </a:ext>
+            </a:extLst>
+          </a:blip>
+          <a:stretch>
+            <a:fillRect/>
+          </a:stretch>
+        </p:blipFill>
         <p:spPr>
           <a:xfrm>
-            <a:off x="1411111" y="1264355"/>
-            <a:ext cx="9144000" cy="1094141"/>
+            <a:off x="228600" y="1008062"/>
+            <a:ext cx="8708231" cy="4857750"/>
+          </a:xfrm>
+          <a:prstGeom prst="rect">
+            <a:avLst/>
+          </a:prstGeom>
+        </p:spPr>
+      </p:pic>
+    </p:spTree>
+    <p:extLst>
+      <p:ext uri="{BB962C8B-B14F-4D97-AF65-F5344CB8AC3E}">
+        <p14:creationId xmlns:p14="http://schemas.microsoft.com/office/powerpoint/2010/main" val="173977642"/>
+      </p:ext>
+    </p:extLst>
+  </p:cSld>
+  <p:clrMapOvr>
+    <a:masterClrMapping/>
+  </p:clrMapOvr>
+</p:sld>
+</file>
+
+<file path=ppt/slides/slide2.xml><?xml version="1.0" encoding="utf-8"?>
+<p:sld xmlns:a="http://schemas.openxmlformats.org/drawingml/2006/main" xmlns:r="http://schemas.openxmlformats.org/officeDocument/2006/relationships" xmlns:p="http://schemas.openxmlformats.org/presentationml/2006/main">
+  <p:cSld>
+    <p:spTree>
+      <p:nvGrpSpPr>
+        <p:cNvPr id="1" name=""/>
+        <p:cNvGrpSpPr/>
+        <p:nvPr/>
+      </p:nvGrpSpPr>
+      <p:grpSpPr>
+        <a:xfrm>
+          <a:off x="0" y="0"/>
+          <a:ext cx="0" cy="0"/>
+          <a:chOff x="0" y="0"/>
+          <a:chExt cx="0" cy="0"/>
+        </a:xfrm>
+      </p:grpSpPr>
+      <p:sp>
+        <p:nvSpPr>
+          <p:cNvPr id="2" name="Title 1"/>
+          <p:cNvSpPr>
+            <a:spLocks noGrp="1"/>
+          </p:cNvSpPr>
+          <p:nvPr>
+            <p:ph type="ctrTitle"/>
+          </p:nvPr>
+        </p:nvSpPr>
+        <p:spPr>
+          <a:xfrm>
+            <a:off x="1523226" y="913597"/>
+            <a:ext cx="5609093" cy="1969452"/>
           </a:xfrm>
         </p:spPr>
         <p:txBody>
-          <a:bodyPr/>
-          <a:lstStyle/>
-          <a:p>
-            <a:r>
-              <a:rPr lang="en-GB" dirty="0" err="1"/>
-              <a:t>Artbud</a:t>
-            </a:r>
+          <a:bodyPr>
+            <a:normAutofit/>
+          </a:bodyPr>
+          <a:lstStyle/>
+          <a:p>
             <a:r>
               <a:rPr lang="en-GB" dirty="0"/>
-              <a:t> Presentation</a:t>
+              <a:t>Artbud – A home for art lovers</a:t>
             </a:r>
           </a:p>
         </p:txBody>
@@ -3007,12 +3078,14 @@
         </p:nvSpPr>
         <p:spPr>
           <a:xfrm>
-            <a:off x="1524000" y="2923822"/>
-            <a:ext cx="9144000" cy="2333978"/>
+            <a:off x="1121484" y="3921486"/>
+            <a:ext cx="6858000" cy="1750484"/>
           </a:xfrm>
         </p:spPr>
         <p:txBody>
-          <a:bodyPr/>
+          <a:bodyPr>
+            <a:normAutofit lnSpcReduction="10000"/>
+          </a:bodyPr>
           <a:lstStyle/>
           <a:p>
             <a:r>
@@ -3069,10 +3142,412 @@
 </p:sld>
 </file>
 
+<file path=ppt/slides/slide3.xml><?xml version="1.0" encoding="utf-8"?>
+<p:sld xmlns:a="http://schemas.openxmlformats.org/drawingml/2006/main" xmlns:r="http://schemas.openxmlformats.org/officeDocument/2006/relationships" xmlns:p="http://schemas.openxmlformats.org/presentationml/2006/main">
+  <p:cSld>
+    <p:spTree>
+      <p:nvGrpSpPr>
+        <p:cNvPr id="1" name=""/>
+        <p:cNvGrpSpPr/>
+        <p:nvPr/>
+      </p:nvGrpSpPr>
+      <p:grpSpPr>
+        <a:xfrm>
+          <a:off x="0" y="0"/>
+          <a:ext cx="0" cy="0"/>
+          <a:chOff x="0" y="0"/>
+          <a:chExt cx="0" cy="0"/>
+        </a:xfrm>
+      </p:grpSpPr>
+      <p:sp>
+        <p:nvSpPr>
+          <p:cNvPr id="2" name="Title 1"/>
+          <p:cNvSpPr>
+            <a:spLocks noGrp="1"/>
+          </p:cNvSpPr>
+          <p:nvPr>
+            <p:ph type="title"/>
+          </p:nvPr>
+        </p:nvSpPr>
+        <p:spPr/>
+        <p:txBody>
+          <a:bodyPr/>
+          <a:lstStyle/>
+          <a:p>
+            <a:r>
+              <a:rPr lang="en-GB" dirty="0"/>
+              <a:t>What is our app?</a:t>
+            </a:r>
+          </a:p>
+        </p:txBody>
+      </p:sp>
+      <p:sp>
+        <p:nvSpPr>
+          <p:cNvPr id="3" name="Content Placeholder 2"/>
+          <p:cNvSpPr>
+            <a:spLocks noGrp="1"/>
+          </p:cNvSpPr>
+          <p:nvPr>
+            <p:ph idx="1"/>
+          </p:nvPr>
+        </p:nvSpPr>
+        <p:spPr/>
+        <p:txBody>
+          <a:bodyPr/>
+          <a:lstStyle/>
+          <a:p>
+            <a:r>
+              <a:rPr lang="en-GB" dirty="0"/>
+              <a:t>Artbud is a place for people to sign up and then upload their artwork, be it sculptures, photographs, paintings, etc. </a:t>
+            </a:r>
+          </a:p>
+          <a:p>
+            <a:r>
+              <a:rPr lang="en-GB" dirty="0"/>
+              <a:t>The artist can write a description for their artwork and set a suggested price.</a:t>
+            </a:r>
+          </a:p>
+          <a:p>
+            <a:r>
+              <a:rPr lang="en-GB" dirty="0"/>
+              <a:t>Others can then view art if they too are logged in and can contact the artist using the email address the artist used on signing up which is automatically displayed on their profile page.</a:t>
+            </a:r>
+          </a:p>
+        </p:txBody>
+      </p:sp>
+    </p:spTree>
+    <p:extLst>
+      <p:ext uri="{BB962C8B-B14F-4D97-AF65-F5344CB8AC3E}">
+        <p14:creationId xmlns:p14="http://schemas.microsoft.com/office/powerpoint/2010/main" val="2829309857"/>
+      </p:ext>
+    </p:extLst>
+  </p:cSld>
+  <p:clrMapOvr>
+    <a:masterClrMapping/>
+  </p:clrMapOvr>
+</p:sld>
+</file>
+
+<file path=ppt/slides/slide4.xml><?xml version="1.0" encoding="utf-8"?>
+<p:sld xmlns:a="http://schemas.openxmlformats.org/drawingml/2006/main" xmlns:r="http://schemas.openxmlformats.org/officeDocument/2006/relationships" xmlns:p="http://schemas.openxmlformats.org/presentationml/2006/main">
+  <p:cSld>
+    <p:spTree>
+      <p:nvGrpSpPr>
+        <p:cNvPr id="1" name=""/>
+        <p:cNvGrpSpPr/>
+        <p:nvPr/>
+      </p:nvGrpSpPr>
+      <p:grpSpPr>
+        <a:xfrm>
+          <a:off x="0" y="0"/>
+          <a:ext cx="0" cy="0"/>
+          <a:chOff x="0" y="0"/>
+          <a:chExt cx="0" cy="0"/>
+        </a:xfrm>
+      </p:grpSpPr>
+      <p:grpSp>
+        <p:nvGrpSpPr>
+          <p:cNvPr id="14" name="Group 13"/>
+          <p:cNvGrpSpPr/>
+          <p:nvPr/>
+        </p:nvGrpSpPr>
+        <p:grpSpPr>
+          <a:xfrm>
+            <a:off x="2776920" y="0"/>
+            <a:ext cx="6367080" cy="6782696"/>
+            <a:chOff x="2361665" y="0"/>
+            <a:chExt cx="6367080" cy="6782696"/>
+          </a:xfrm>
+        </p:grpSpPr>
+        <p:pic>
+          <p:nvPicPr>
+            <p:cNvPr id="12" name="Picture 11"/>
+            <p:cNvPicPr>
+              <a:picLocks noChangeAspect="1"/>
+            </p:cNvPicPr>
+            <p:nvPr/>
+          </p:nvPicPr>
+          <p:blipFill rotWithShape="1">
+            <a:blip r:embed="rId2">
+              <a:extLst>
+                <a:ext uri="{28A0092B-C50C-407E-A947-70E740481C1C}">
+                  <a14:useLocalDpi xmlns:a14="http://schemas.microsoft.com/office/drawing/2010/main" val="0"/>
+                </a:ext>
+              </a:extLst>
+            </a:blip>
+            <a:srcRect t="1098"/>
+            <a:stretch/>
+          </p:blipFill>
+          <p:spPr>
+            <a:xfrm>
+              <a:off x="2361665" y="0"/>
+              <a:ext cx="6367080" cy="6782696"/>
+            </a:xfrm>
+            <a:prstGeom prst="rect">
+              <a:avLst/>
+            </a:prstGeom>
+          </p:spPr>
+        </p:pic>
+        <p:sp>
+          <p:nvSpPr>
+            <p:cNvPr id="13" name="Rectangle 12"/>
+            <p:cNvSpPr/>
+            <p:nvPr/>
+          </p:nvSpPr>
+          <p:spPr>
+            <a:xfrm>
+              <a:off x="4404171" y="0"/>
+              <a:ext cx="4324574" cy="387275"/>
+            </a:xfrm>
+            <a:prstGeom prst="rect">
+              <a:avLst/>
+            </a:prstGeom>
+            <a:solidFill>
+              <a:schemeClr val="bg1"/>
+            </a:solidFill>
+            <a:ln>
+              <a:noFill/>
+            </a:ln>
+          </p:spPr>
+          <p:style>
+            <a:lnRef idx="2">
+              <a:schemeClr val="accent1">
+                <a:shade val="50000"/>
+              </a:schemeClr>
+            </a:lnRef>
+            <a:fillRef idx="1">
+              <a:schemeClr val="accent1"/>
+            </a:fillRef>
+            <a:effectRef idx="0">
+              <a:schemeClr val="accent1"/>
+            </a:effectRef>
+            <a:fontRef idx="minor">
+              <a:schemeClr val="lt1"/>
+            </a:fontRef>
+          </p:style>
+          <p:txBody>
+            <a:bodyPr rtlCol="0" anchor="ctr"/>
+            <a:lstStyle/>
+            <a:p>
+              <a:pPr algn="ctr"/>
+              <a:endParaRPr lang="en-GB"/>
+            </a:p>
+          </p:txBody>
+        </p:sp>
+      </p:grpSp>
+    </p:spTree>
+    <p:extLst>
+      <p:ext uri="{BB962C8B-B14F-4D97-AF65-F5344CB8AC3E}">
+        <p14:creationId xmlns:p14="http://schemas.microsoft.com/office/powerpoint/2010/main" val="3658860307"/>
+      </p:ext>
+    </p:extLst>
+  </p:cSld>
+  <p:clrMapOvr>
+    <a:masterClrMapping/>
+  </p:clrMapOvr>
+</p:sld>
+</file>
+
+<file path=ppt/slides/slide5.xml><?xml version="1.0" encoding="utf-8"?>
+<p:sld xmlns:a="http://schemas.openxmlformats.org/drawingml/2006/main" xmlns:r="http://schemas.openxmlformats.org/officeDocument/2006/relationships" xmlns:p="http://schemas.openxmlformats.org/presentationml/2006/main">
+  <p:cSld>
+    <p:spTree>
+      <p:nvGrpSpPr>
+        <p:cNvPr id="1" name=""/>
+        <p:cNvGrpSpPr/>
+        <p:nvPr/>
+      </p:nvGrpSpPr>
+      <p:grpSpPr>
+        <a:xfrm>
+          <a:off x="0" y="0"/>
+          <a:ext cx="0" cy="0"/>
+          <a:chOff x="0" y="0"/>
+          <a:chExt cx="0" cy="0"/>
+        </a:xfrm>
+      </p:grpSpPr>
+      <p:pic>
+        <p:nvPicPr>
+          <p:cNvPr id="4" name="Picture 3"/>
+          <p:cNvPicPr>
+            <a:picLocks noChangeAspect="1"/>
+          </p:cNvPicPr>
+          <p:nvPr/>
+        </p:nvPicPr>
+        <p:blipFill>
+          <a:blip r:embed="rId2">
+            <a:extLst>
+              <a:ext uri="{28A0092B-C50C-407E-A947-70E740481C1C}">
+                <a14:useLocalDpi xmlns:a14="http://schemas.microsoft.com/office/drawing/2010/main" val="0"/>
+              </a:ext>
+            </a:extLst>
+          </a:blip>
+          <a:stretch>
+            <a:fillRect/>
+          </a:stretch>
+        </p:blipFill>
+        <p:spPr>
+          <a:xfrm>
+            <a:off x="2009631" y="297853"/>
+            <a:ext cx="6889335" cy="6145977"/>
+          </a:xfrm>
+          <a:prstGeom prst="rect">
+            <a:avLst/>
+          </a:prstGeom>
+        </p:spPr>
+      </p:pic>
+    </p:spTree>
+    <p:extLst>
+      <p:ext uri="{BB962C8B-B14F-4D97-AF65-F5344CB8AC3E}">
+        <p14:creationId xmlns:p14="http://schemas.microsoft.com/office/powerpoint/2010/main" val="1602321265"/>
+      </p:ext>
+    </p:extLst>
+  </p:cSld>
+  <p:clrMapOvr>
+    <a:masterClrMapping/>
+  </p:clrMapOvr>
+</p:sld>
+</file>
+
+<file path=ppt/slides/slide6.xml><?xml version="1.0" encoding="utf-8"?>
+<p:sld xmlns:a="http://schemas.openxmlformats.org/drawingml/2006/main" xmlns:r="http://schemas.openxmlformats.org/officeDocument/2006/relationships" xmlns:p="http://schemas.openxmlformats.org/presentationml/2006/main">
+  <p:cSld>
+    <p:spTree>
+      <p:nvGrpSpPr>
+        <p:cNvPr id="1" name=""/>
+        <p:cNvGrpSpPr/>
+        <p:nvPr/>
+      </p:nvGrpSpPr>
+      <p:grpSpPr>
+        <a:xfrm>
+          <a:off x="0" y="0"/>
+          <a:ext cx="0" cy="0"/>
+          <a:chOff x="0" y="0"/>
+          <a:chExt cx="0" cy="0"/>
+        </a:xfrm>
+      </p:grpSpPr>
+      <p:sp>
+        <p:nvSpPr>
+          <p:cNvPr id="2" name="Title 1"/>
+          <p:cNvSpPr>
+            <a:spLocks noGrp="1"/>
+          </p:cNvSpPr>
+          <p:nvPr>
+            <p:ph type="title"/>
+          </p:nvPr>
+        </p:nvSpPr>
+        <p:spPr/>
+        <p:txBody>
+          <a:bodyPr/>
+          <a:lstStyle/>
+          <a:p>
+            <a:endParaRPr lang="en-GB"/>
+          </a:p>
+        </p:txBody>
+      </p:sp>
+      <p:sp>
+        <p:nvSpPr>
+          <p:cNvPr id="3" name="Content Placeholder 2"/>
+          <p:cNvSpPr>
+            <a:spLocks noGrp="1"/>
+          </p:cNvSpPr>
+          <p:nvPr>
+            <p:ph idx="1"/>
+          </p:nvPr>
+        </p:nvSpPr>
+        <p:spPr/>
+        <p:txBody>
+          <a:bodyPr/>
+          <a:lstStyle/>
+          <a:p>
+            <a:endParaRPr lang="en-GB"/>
+          </a:p>
+        </p:txBody>
+      </p:sp>
+    </p:spTree>
+    <p:extLst>
+      <p:ext uri="{BB962C8B-B14F-4D97-AF65-F5344CB8AC3E}">
+        <p14:creationId xmlns:p14="http://schemas.microsoft.com/office/powerpoint/2010/main" val="388545785"/>
+      </p:ext>
+    </p:extLst>
+  </p:cSld>
+  <p:clrMapOvr>
+    <a:masterClrMapping/>
+  </p:clrMapOvr>
+</p:sld>
+</file>
+
+<file path=ppt/slides/slide7.xml><?xml version="1.0" encoding="utf-8"?>
+<p:sld xmlns:a="http://schemas.openxmlformats.org/drawingml/2006/main" xmlns:r="http://schemas.openxmlformats.org/officeDocument/2006/relationships" xmlns:p="http://schemas.openxmlformats.org/presentationml/2006/main">
+  <p:cSld>
+    <p:spTree>
+      <p:nvGrpSpPr>
+        <p:cNvPr id="1" name=""/>
+        <p:cNvGrpSpPr/>
+        <p:nvPr/>
+      </p:nvGrpSpPr>
+      <p:grpSpPr>
+        <a:xfrm>
+          <a:off x="0" y="0"/>
+          <a:ext cx="0" cy="0"/>
+          <a:chOff x="0" y="0"/>
+          <a:chExt cx="0" cy="0"/>
+        </a:xfrm>
+      </p:grpSpPr>
+      <p:sp>
+        <p:nvSpPr>
+          <p:cNvPr id="2" name="Title 1"/>
+          <p:cNvSpPr>
+            <a:spLocks noGrp="1"/>
+          </p:cNvSpPr>
+          <p:nvPr>
+            <p:ph type="title"/>
+          </p:nvPr>
+        </p:nvSpPr>
+        <p:spPr/>
+        <p:txBody>
+          <a:bodyPr/>
+          <a:lstStyle/>
+          <a:p>
+            <a:endParaRPr lang="en-GB"/>
+          </a:p>
+        </p:txBody>
+      </p:sp>
+      <p:sp>
+        <p:nvSpPr>
+          <p:cNvPr id="3" name="Content Placeholder 2"/>
+          <p:cNvSpPr>
+            <a:spLocks noGrp="1"/>
+          </p:cNvSpPr>
+          <p:nvPr>
+            <p:ph idx="1"/>
+          </p:nvPr>
+        </p:nvSpPr>
+        <p:spPr/>
+        <p:txBody>
+          <a:bodyPr/>
+          <a:lstStyle/>
+          <a:p>
+            <a:endParaRPr lang="en-GB"/>
+          </a:p>
+        </p:txBody>
+      </p:sp>
+    </p:spTree>
+    <p:extLst>
+      <p:ext uri="{BB962C8B-B14F-4D97-AF65-F5344CB8AC3E}">
+        <p14:creationId xmlns:p14="http://schemas.microsoft.com/office/powerpoint/2010/main" val="356781965"/>
+      </p:ext>
+    </p:extLst>
+  </p:cSld>
+  <p:clrMapOvr>
+    <a:masterClrMapping/>
+  </p:clrMapOvr>
+</p:sld>
+</file>
+
 <file path=ppt/theme/theme1.xml><?xml version="1.0" encoding="utf-8"?>
 <a:theme xmlns:a="http://schemas.openxmlformats.org/drawingml/2006/main" name="Office Theme">
   <a:themeElements>
-    <a:clrScheme name="Office">
+    <a:clrScheme name="Office Theme">
       <a:dk1>
         <a:sysClr val="windowText" lastClr="000000"/>
       </a:dk1>
@@ -3110,7 +3585,7 @@
         <a:srgbClr val="954F72"/>
       </a:folHlink>
     </a:clrScheme>
-    <a:fontScheme name="Office">
+    <a:fontScheme name="Office Theme">
       <a:majorFont>
         <a:latin typeface="Calibri Light" panose="020F0302020204030204"/>
         <a:ea typeface=""/>
@@ -3145,23 +3620,6 @@
         <a:font script="Viet" typeface="Times New Roman"/>
         <a:font script="Uigh" typeface="Microsoft Uighur"/>
         <a:font script="Geor" typeface="Sylfaen"/>
-        <a:font script="Armn" typeface="Arial"/>
-        <a:font script="Bugi" typeface="Leelawadee UI"/>
-        <a:font script="Bopo" typeface="Microsoft JhengHei"/>
-        <a:font script="Java" typeface="Javanese Text"/>
-        <a:font script="Lisu" typeface="Segoe UI"/>
-        <a:font script="Mymr" typeface="Myanmar Text"/>
-        <a:font script="Nkoo" typeface="Ebrima"/>
-        <a:font script="Olck" typeface="Nirmala UI"/>
-        <a:font script="Osma" typeface="Ebrima"/>
-        <a:font script="Phag" typeface="Phagspa"/>
-        <a:font script="Syrn" typeface="Estrangelo Edessa"/>
-        <a:font script="Syrj" typeface="Estrangelo Edessa"/>
-        <a:font script="Syre" typeface="Estrangelo Edessa"/>
-        <a:font script="Sora" typeface="Nirmala UI"/>
-        <a:font script="Tale" typeface="Microsoft Tai Le"/>
-        <a:font script="Talu" typeface="Microsoft New Tai Lue"/>
-        <a:font script="Tfng" typeface="Ebrima"/>
       </a:majorFont>
       <a:minorFont>
         <a:latin typeface="Calibri" panose="020F0502020204030204"/>
@@ -3197,26 +3655,9 @@
         <a:font script="Viet" typeface="Arial"/>
         <a:font script="Uigh" typeface="Microsoft Uighur"/>
         <a:font script="Geor" typeface="Sylfaen"/>
-        <a:font script="Armn" typeface="Arial"/>
-        <a:font script="Bugi" typeface="Leelawadee UI"/>
-        <a:font script="Bopo" typeface="Microsoft JhengHei"/>
-        <a:font script="Java" typeface="Javanese Text"/>
-        <a:font script="Lisu" typeface="Segoe UI"/>
-        <a:font script="Mymr" typeface="Myanmar Text"/>
-        <a:font script="Nkoo" typeface="Ebrima"/>
-        <a:font script="Olck" typeface="Nirmala UI"/>
-        <a:font script="Osma" typeface="Ebrima"/>
-        <a:font script="Phag" typeface="Phagspa"/>
-        <a:font script="Syrn" typeface="Estrangelo Edessa"/>
-        <a:font script="Syrj" typeface="Estrangelo Edessa"/>
-        <a:font script="Syre" typeface="Estrangelo Edessa"/>
-        <a:font script="Sora" typeface="Nirmala UI"/>
-        <a:font script="Tale" typeface="Microsoft Tai Le"/>
-        <a:font script="Talu" typeface="Microsoft New Tai Lue"/>
-        <a:font script="Tfng" typeface="Ebrima"/>
       </a:minorFont>
     </a:fontScheme>
-    <a:fmtScheme name="Office">
+    <a:fmtScheme name="Office Theme">
       <a:fillStyleLst>
         <a:solidFill>
           <a:schemeClr val="phClr"/>

</xml_diff>

<commit_message>
added wireframes to presentation
</commit_message>
<xml_diff>
--- a/presentation_material/powerpoint.pptx
+++ b/presentation_material/powerpoint.pptx
@@ -3335,6 +3335,552 @@
           </p:txBody>
         </p:sp>
       </p:grpSp>
+      <p:grpSp>
+        <p:nvGrpSpPr>
+          <p:cNvPr id="20" name="Group 19"/>
+          <p:cNvGrpSpPr/>
+          <p:nvPr/>
+        </p:nvGrpSpPr>
+        <p:grpSpPr>
+          <a:xfrm>
+            <a:off x="1794933" y="2359076"/>
+            <a:ext cx="5808134" cy="1857324"/>
+            <a:chOff x="1481667" y="2497667"/>
+            <a:chExt cx="6121400" cy="1761066"/>
+          </a:xfrm>
+        </p:grpSpPr>
+        <p:cxnSp>
+          <p:nvCxnSpPr>
+            <p:cNvPr id="4" name="Straight Arrow Connector 3"/>
+            <p:cNvCxnSpPr>
+              <a:cxnSpLocks/>
+            </p:cNvCxnSpPr>
+            <p:nvPr/>
+          </p:nvCxnSpPr>
+          <p:spPr>
+            <a:xfrm flipV="1">
+              <a:off x="1481667" y="2523068"/>
+              <a:ext cx="1820333" cy="1202265"/>
+            </a:xfrm>
+            <a:prstGeom prst="straightConnector1">
+              <a:avLst/>
+            </a:prstGeom>
+            <a:ln>
+              <a:tailEnd type="triangle"/>
+            </a:ln>
+          </p:spPr>
+          <p:style>
+            <a:lnRef idx="1">
+              <a:schemeClr val="accent1"/>
+            </a:lnRef>
+            <a:fillRef idx="0">
+              <a:schemeClr val="accent1"/>
+            </a:fillRef>
+            <a:effectRef idx="0">
+              <a:schemeClr val="accent1"/>
+            </a:effectRef>
+            <a:fontRef idx="minor">
+              <a:schemeClr val="tx1"/>
+            </a:fontRef>
+          </p:style>
+        </p:cxnSp>
+        <p:cxnSp>
+          <p:nvCxnSpPr>
+            <p:cNvPr id="6" name="Straight Arrow Connector 5"/>
+            <p:cNvCxnSpPr>
+              <a:cxnSpLocks/>
+            </p:cNvCxnSpPr>
+            <p:nvPr/>
+          </p:nvCxnSpPr>
+          <p:spPr>
+            <a:xfrm flipV="1">
+              <a:off x="1481667" y="2497667"/>
+              <a:ext cx="4055533" cy="1227666"/>
+            </a:xfrm>
+            <a:prstGeom prst="straightConnector1">
+              <a:avLst/>
+            </a:prstGeom>
+            <a:ln>
+              <a:tailEnd type="triangle"/>
+            </a:ln>
+          </p:spPr>
+          <p:style>
+            <a:lnRef idx="1">
+              <a:schemeClr val="accent1"/>
+            </a:lnRef>
+            <a:fillRef idx="0">
+              <a:schemeClr val="accent1"/>
+            </a:fillRef>
+            <a:effectRef idx="0">
+              <a:schemeClr val="accent1"/>
+            </a:effectRef>
+            <a:fontRef idx="minor">
+              <a:schemeClr val="tx1"/>
+            </a:fontRef>
+          </p:style>
+        </p:cxnSp>
+        <p:cxnSp>
+          <p:nvCxnSpPr>
+            <p:cNvPr id="8" name="Straight Arrow Connector 7"/>
+            <p:cNvCxnSpPr>
+              <a:cxnSpLocks/>
+            </p:cNvCxnSpPr>
+            <p:nvPr/>
+          </p:nvCxnSpPr>
+          <p:spPr>
+            <a:xfrm flipV="1">
+              <a:off x="1481667" y="2497667"/>
+              <a:ext cx="6121400" cy="1227666"/>
+            </a:xfrm>
+            <a:prstGeom prst="straightConnector1">
+              <a:avLst/>
+            </a:prstGeom>
+            <a:ln>
+              <a:tailEnd type="triangle"/>
+            </a:ln>
+          </p:spPr>
+          <p:style>
+            <a:lnRef idx="1">
+              <a:schemeClr val="accent1"/>
+            </a:lnRef>
+            <a:fillRef idx="0">
+              <a:schemeClr val="accent1"/>
+            </a:fillRef>
+            <a:effectRef idx="0">
+              <a:schemeClr val="accent1"/>
+            </a:effectRef>
+            <a:fontRef idx="minor">
+              <a:schemeClr val="tx1"/>
+            </a:fontRef>
+          </p:style>
+        </p:cxnSp>
+        <p:cxnSp>
+          <p:nvCxnSpPr>
+            <p:cNvPr id="10" name="Straight Arrow Connector 9"/>
+            <p:cNvCxnSpPr>
+              <a:cxnSpLocks/>
+            </p:cNvCxnSpPr>
+            <p:nvPr/>
+          </p:nvCxnSpPr>
+          <p:spPr>
+            <a:xfrm>
+              <a:off x="1481667" y="3725333"/>
+              <a:ext cx="2844800" cy="533400"/>
+            </a:xfrm>
+            <a:prstGeom prst="straightConnector1">
+              <a:avLst/>
+            </a:prstGeom>
+            <a:ln>
+              <a:tailEnd type="triangle"/>
+            </a:ln>
+          </p:spPr>
+          <p:style>
+            <a:lnRef idx="1">
+              <a:schemeClr val="accent1"/>
+            </a:lnRef>
+            <a:fillRef idx="0">
+              <a:schemeClr val="accent1"/>
+            </a:fillRef>
+            <a:effectRef idx="0">
+              <a:schemeClr val="accent1"/>
+            </a:effectRef>
+            <a:fontRef idx="minor">
+              <a:schemeClr val="tx1"/>
+            </a:fontRef>
+          </p:style>
+        </p:cxnSp>
+        <p:cxnSp>
+          <p:nvCxnSpPr>
+            <p:cNvPr id="15" name="Straight Arrow Connector 14"/>
+            <p:cNvCxnSpPr/>
+            <p:nvPr/>
+          </p:nvCxnSpPr>
+          <p:spPr>
+            <a:xfrm>
+              <a:off x="1481667" y="3725333"/>
+              <a:ext cx="5427133" cy="440267"/>
+            </a:xfrm>
+            <a:prstGeom prst="straightConnector1">
+              <a:avLst/>
+            </a:prstGeom>
+            <a:ln>
+              <a:tailEnd type="triangle"/>
+            </a:ln>
+          </p:spPr>
+          <p:style>
+            <a:lnRef idx="1">
+              <a:schemeClr val="accent1"/>
+            </a:lnRef>
+            <a:fillRef idx="0">
+              <a:schemeClr val="accent1"/>
+            </a:fillRef>
+            <a:effectRef idx="0">
+              <a:schemeClr val="accent1"/>
+            </a:effectRef>
+            <a:fontRef idx="minor">
+              <a:schemeClr val="tx1"/>
+            </a:fontRef>
+          </p:style>
+        </p:cxnSp>
+      </p:grpSp>
+      <p:sp>
+        <p:nvSpPr>
+          <p:cNvPr id="21" name="TextBox 20"/>
+          <p:cNvSpPr txBox="1"/>
+          <p:nvPr/>
+        </p:nvSpPr>
+        <p:spPr>
+          <a:xfrm>
+            <a:off x="656939" y="3359039"/>
+            <a:ext cx="1137994" cy="584775"/>
+          </a:xfrm>
+          <a:prstGeom prst="rect">
+            <a:avLst/>
+          </a:prstGeom>
+          <a:noFill/>
+        </p:spPr>
+        <p:txBody>
+          <a:bodyPr wrap="square" rtlCol="0">
+            <a:spAutoFit/>
+          </a:bodyPr>
+          <a:lstStyle/>
+          <a:p>
+            <a:r>
+              <a:rPr lang="en-GB" sz="1600" dirty="0">
+                <a:latin typeface="+mj-lt"/>
+              </a:rPr>
+              <a:t>Artwork</a:t>
+            </a:r>
+          </a:p>
+          <a:p>
+            <a:r>
+              <a:rPr lang="en-GB" sz="1600" dirty="0">
+                <a:latin typeface="+mj-lt"/>
+              </a:rPr>
+              <a:t>categories</a:t>
+            </a:r>
+          </a:p>
+        </p:txBody>
+      </p:sp>
+      <p:cxnSp>
+        <p:nvCxnSpPr>
+          <p:cNvPr id="22" name="Straight Arrow Connector 21"/>
+          <p:cNvCxnSpPr>
+            <a:cxnSpLocks/>
+          </p:cNvCxnSpPr>
+          <p:nvPr/>
+        </p:nvCxnSpPr>
+        <p:spPr>
+          <a:xfrm flipV="1">
+            <a:off x="1757220" y="489890"/>
+            <a:ext cx="1519208" cy="1174044"/>
+          </a:xfrm>
+          <a:prstGeom prst="straightConnector1">
+            <a:avLst/>
+          </a:prstGeom>
+          <a:ln>
+            <a:tailEnd type="triangle"/>
+          </a:ln>
+        </p:spPr>
+        <p:style>
+          <a:lnRef idx="1">
+            <a:schemeClr val="accent1"/>
+          </a:lnRef>
+          <a:fillRef idx="0">
+            <a:schemeClr val="accent1"/>
+          </a:fillRef>
+          <a:effectRef idx="0">
+            <a:schemeClr val="accent1"/>
+          </a:effectRef>
+          <a:fontRef idx="minor">
+            <a:schemeClr val="tx1"/>
+          </a:fontRef>
+        </p:style>
+      </p:cxnSp>
+      <p:cxnSp>
+        <p:nvCxnSpPr>
+          <p:cNvPr id="25" name="Straight Arrow Connector 24"/>
+          <p:cNvCxnSpPr>
+            <a:cxnSpLocks/>
+          </p:cNvCxnSpPr>
+          <p:nvPr/>
+        </p:nvCxnSpPr>
+        <p:spPr>
+          <a:xfrm flipV="1">
+            <a:off x="1981200" y="891125"/>
+            <a:ext cx="3208682" cy="1660358"/>
+          </a:xfrm>
+          <a:prstGeom prst="straightConnector1">
+            <a:avLst/>
+          </a:prstGeom>
+          <a:ln>
+            <a:tailEnd type="triangle"/>
+          </a:ln>
+        </p:spPr>
+        <p:style>
+          <a:lnRef idx="1">
+            <a:schemeClr val="accent1"/>
+          </a:lnRef>
+          <a:fillRef idx="0">
+            <a:schemeClr val="accent1"/>
+          </a:fillRef>
+          <a:effectRef idx="0">
+            <a:schemeClr val="accent1"/>
+          </a:effectRef>
+          <a:fontRef idx="minor">
+            <a:schemeClr val="tx1"/>
+          </a:fontRef>
+        </p:style>
+      </p:cxnSp>
+      <p:sp>
+        <p:nvSpPr>
+          <p:cNvPr id="28" name="TextBox 27"/>
+          <p:cNvSpPr txBox="1"/>
+          <p:nvPr/>
+        </p:nvSpPr>
+        <p:spPr>
+          <a:xfrm>
+            <a:off x="493526" y="2463984"/>
+            <a:ext cx="1742619" cy="338554"/>
+          </a:xfrm>
+          <a:prstGeom prst="rect">
+            <a:avLst/>
+          </a:prstGeom>
+          <a:noFill/>
+        </p:spPr>
+        <p:txBody>
+          <a:bodyPr wrap="square" rtlCol="0">
+            <a:spAutoFit/>
+          </a:bodyPr>
+          <a:lstStyle/>
+          <a:p>
+            <a:r>
+              <a:rPr lang="en-GB" sz="1600" dirty="0">
+                <a:latin typeface="+mj-lt"/>
+              </a:rPr>
+              <a:t>Navigation bar</a:t>
+            </a:r>
+          </a:p>
+        </p:txBody>
+      </p:sp>
+      <p:sp>
+        <p:nvSpPr>
+          <p:cNvPr id="29" name="TextBox 28"/>
+          <p:cNvSpPr txBox="1"/>
+          <p:nvPr/>
+        </p:nvSpPr>
+        <p:spPr>
+          <a:xfrm>
+            <a:off x="582417" y="1603937"/>
+            <a:ext cx="1742619" cy="338554"/>
+          </a:xfrm>
+          <a:prstGeom prst="rect">
+            <a:avLst/>
+          </a:prstGeom>
+          <a:noFill/>
+        </p:spPr>
+        <p:txBody>
+          <a:bodyPr wrap="square" rtlCol="0">
+            <a:spAutoFit/>
+          </a:bodyPr>
+          <a:lstStyle/>
+          <a:p>
+            <a:r>
+              <a:rPr lang="en-GB" sz="1600" dirty="0">
+                <a:latin typeface="+mj-lt"/>
+              </a:rPr>
+              <a:t>Artbud logo</a:t>
+            </a:r>
+          </a:p>
+        </p:txBody>
+      </p:sp>
+      <p:grpSp>
+        <p:nvGrpSpPr>
+          <p:cNvPr id="39" name="Group 38"/>
+          <p:cNvGrpSpPr/>
+          <p:nvPr/>
+        </p:nvGrpSpPr>
+        <p:grpSpPr>
+          <a:xfrm>
+            <a:off x="2209800" y="5105401"/>
+            <a:ext cx="5046132" cy="677332"/>
+            <a:chOff x="1794933" y="5190067"/>
+            <a:chExt cx="5504142" cy="592666"/>
+          </a:xfrm>
+        </p:grpSpPr>
+        <p:cxnSp>
+          <p:nvCxnSpPr>
+            <p:cNvPr id="30" name="Straight Arrow Connector 29"/>
+            <p:cNvCxnSpPr>
+              <a:cxnSpLocks/>
+            </p:cNvCxnSpPr>
+            <p:nvPr/>
+          </p:nvCxnSpPr>
+          <p:spPr>
+            <a:xfrm>
+              <a:off x="1794933" y="5190067"/>
+              <a:ext cx="1163440" cy="511679"/>
+            </a:xfrm>
+            <a:prstGeom prst="straightConnector1">
+              <a:avLst/>
+            </a:prstGeom>
+            <a:ln>
+              <a:tailEnd type="triangle"/>
+            </a:ln>
+          </p:spPr>
+          <p:style>
+            <a:lnRef idx="1">
+              <a:schemeClr val="accent1"/>
+            </a:lnRef>
+            <a:fillRef idx="0">
+              <a:schemeClr val="accent1"/>
+            </a:fillRef>
+            <a:effectRef idx="0">
+              <a:schemeClr val="accent1"/>
+            </a:effectRef>
+            <a:fontRef idx="minor">
+              <a:schemeClr val="tx1"/>
+            </a:fontRef>
+          </p:style>
+        </p:cxnSp>
+        <p:cxnSp>
+          <p:nvCxnSpPr>
+            <p:cNvPr id="32" name="Straight Arrow Connector 31"/>
+            <p:cNvCxnSpPr>
+              <a:cxnSpLocks/>
+            </p:cNvCxnSpPr>
+            <p:nvPr/>
+          </p:nvCxnSpPr>
+          <p:spPr>
+            <a:xfrm>
+              <a:off x="1804984" y="5190067"/>
+              <a:ext cx="3490067" cy="592666"/>
+            </a:xfrm>
+            <a:prstGeom prst="straightConnector1">
+              <a:avLst/>
+            </a:prstGeom>
+            <a:ln>
+              <a:tailEnd type="triangle"/>
+            </a:ln>
+          </p:spPr>
+          <p:style>
+            <a:lnRef idx="1">
+              <a:schemeClr val="accent1"/>
+            </a:lnRef>
+            <a:fillRef idx="0">
+              <a:schemeClr val="accent1"/>
+            </a:fillRef>
+            <a:effectRef idx="0">
+              <a:schemeClr val="accent1"/>
+            </a:effectRef>
+            <a:fontRef idx="minor">
+              <a:schemeClr val="tx1"/>
+            </a:fontRef>
+          </p:style>
+        </p:cxnSp>
+        <p:cxnSp>
+          <p:nvCxnSpPr>
+            <p:cNvPr id="33" name="Straight Arrow Connector 32"/>
+            <p:cNvCxnSpPr>
+              <a:cxnSpLocks/>
+            </p:cNvCxnSpPr>
+            <p:nvPr/>
+          </p:nvCxnSpPr>
+          <p:spPr>
+            <a:xfrm>
+              <a:off x="1804984" y="5190067"/>
+              <a:ext cx="5494091" cy="592666"/>
+            </a:xfrm>
+            <a:prstGeom prst="straightConnector1">
+              <a:avLst/>
+            </a:prstGeom>
+            <a:ln>
+              <a:tailEnd type="triangle"/>
+            </a:ln>
+          </p:spPr>
+          <p:style>
+            <a:lnRef idx="1">
+              <a:schemeClr val="accent1"/>
+            </a:lnRef>
+            <a:fillRef idx="0">
+              <a:schemeClr val="accent1"/>
+            </a:fillRef>
+            <a:effectRef idx="0">
+              <a:schemeClr val="accent1"/>
+            </a:effectRef>
+            <a:fontRef idx="minor">
+              <a:schemeClr val="tx1"/>
+            </a:fontRef>
+          </p:style>
+        </p:cxnSp>
+      </p:grpSp>
+      <p:sp>
+        <p:nvSpPr>
+          <p:cNvPr id="40" name="TextBox 39"/>
+          <p:cNvSpPr txBox="1"/>
+          <p:nvPr/>
+        </p:nvSpPr>
+        <p:spPr>
+          <a:xfrm>
+            <a:off x="306448" y="4628573"/>
+            <a:ext cx="2318206" cy="584775"/>
+          </a:xfrm>
+          <a:prstGeom prst="rect">
+            <a:avLst/>
+          </a:prstGeom>
+          <a:noFill/>
+        </p:spPr>
+        <p:txBody>
+          <a:bodyPr wrap="square" rtlCol="0">
+            <a:spAutoFit/>
+          </a:bodyPr>
+          <a:lstStyle/>
+          <a:p>
+            <a:r>
+              <a:rPr lang="en-GB" sz="1600" dirty="0">
+                <a:latin typeface="+mj-lt"/>
+              </a:rPr>
+              <a:t>Footer with tweets, about section and contact</a:t>
+            </a:r>
+          </a:p>
+        </p:txBody>
+      </p:sp>
+      <p:sp>
+        <p:nvSpPr>
+          <p:cNvPr id="44" name="TextBox 43"/>
+          <p:cNvSpPr txBox="1"/>
+          <p:nvPr/>
+        </p:nvSpPr>
+        <p:spPr>
+          <a:xfrm>
+            <a:off x="425426" y="241128"/>
+            <a:ext cx="2538486" cy="707886"/>
+          </a:xfrm>
+          <a:prstGeom prst="rect">
+            <a:avLst/>
+          </a:prstGeom>
+          <a:noFill/>
+        </p:spPr>
+        <p:txBody>
+          <a:bodyPr wrap="square" rtlCol="0">
+            <a:spAutoFit/>
+          </a:bodyPr>
+          <a:lstStyle/>
+          <a:p>
+            <a:r>
+              <a:rPr lang="en-GB" sz="2000" dirty="0"/>
+              <a:t>Wireframe from </a:t>
+            </a:r>
+            <a:br>
+              <a:rPr lang="en-GB" sz="2000" dirty="0"/>
+            </a:br>
+            <a:r>
+              <a:rPr lang="en-GB" sz="2000" dirty="0"/>
+              <a:t>Design Spec</a:t>
+            </a:r>
+          </a:p>
+        </p:txBody>
+      </p:sp>
     </p:spTree>
     <p:extLst>
       <p:ext uri="{BB962C8B-B14F-4D97-AF65-F5344CB8AC3E}">
@@ -3387,7 +3933,7 @@
         </p:blipFill>
         <p:spPr>
           <a:xfrm>
-            <a:off x="2009631" y="297853"/>
+            <a:off x="2102766" y="297853"/>
             <a:ext cx="6889335" cy="6145977"/>
           </a:xfrm>
           <a:prstGeom prst="rect">
@@ -3395,6 +3941,564 @@
           </a:prstGeom>
         </p:spPr>
       </p:pic>
+      <p:grpSp>
+        <p:nvGrpSpPr>
+          <p:cNvPr id="3" name="Group 2"/>
+          <p:cNvGrpSpPr/>
+          <p:nvPr/>
+        </p:nvGrpSpPr>
+        <p:grpSpPr>
+          <a:xfrm>
+            <a:off x="1786468" y="2290942"/>
+            <a:ext cx="5427134" cy="1711559"/>
+            <a:chOff x="1481667" y="2449120"/>
+            <a:chExt cx="5719850" cy="1622855"/>
+          </a:xfrm>
+        </p:grpSpPr>
+        <p:cxnSp>
+          <p:nvCxnSpPr>
+            <p:cNvPr id="5" name="Straight Arrow Connector 4"/>
+            <p:cNvCxnSpPr>
+              <a:cxnSpLocks/>
+            </p:cNvCxnSpPr>
+            <p:nvPr/>
+          </p:nvCxnSpPr>
+          <p:spPr>
+            <a:xfrm flipV="1">
+              <a:off x="1481667" y="2514421"/>
+              <a:ext cx="1664382" cy="1210912"/>
+            </a:xfrm>
+            <a:prstGeom prst="straightConnector1">
+              <a:avLst/>
+            </a:prstGeom>
+            <a:ln>
+              <a:tailEnd type="triangle"/>
+            </a:ln>
+          </p:spPr>
+          <p:style>
+            <a:lnRef idx="1">
+              <a:schemeClr val="accent1"/>
+            </a:lnRef>
+            <a:fillRef idx="0">
+              <a:schemeClr val="accent1"/>
+            </a:fillRef>
+            <a:effectRef idx="0">
+              <a:schemeClr val="accent1"/>
+            </a:effectRef>
+            <a:fontRef idx="minor">
+              <a:schemeClr val="tx1"/>
+            </a:fontRef>
+          </p:style>
+        </p:cxnSp>
+        <p:cxnSp>
+          <p:nvCxnSpPr>
+            <p:cNvPr id="6" name="Straight Arrow Connector 5"/>
+            <p:cNvCxnSpPr>
+              <a:cxnSpLocks/>
+            </p:cNvCxnSpPr>
+            <p:nvPr/>
+          </p:nvCxnSpPr>
+          <p:spPr>
+            <a:xfrm flipV="1">
+              <a:off x="1481667" y="2449120"/>
+              <a:ext cx="5309377" cy="1276214"/>
+            </a:xfrm>
+            <a:prstGeom prst="straightConnector1">
+              <a:avLst/>
+            </a:prstGeom>
+            <a:ln>
+              <a:tailEnd type="triangle"/>
+            </a:ln>
+          </p:spPr>
+          <p:style>
+            <a:lnRef idx="1">
+              <a:schemeClr val="accent1"/>
+            </a:lnRef>
+            <a:fillRef idx="0">
+              <a:schemeClr val="accent1"/>
+            </a:fillRef>
+            <a:effectRef idx="0">
+              <a:schemeClr val="accent1"/>
+            </a:effectRef>
+            <a:fontRef idx="minor">
+              <a:schemeClr val="tx1"/>
+            </a:fontRef>
+          </p:style>
+        </p:cxnSp>
+        <p:cxnSp>
+          <p:nvCxnSpPr>
+            <p:cNvPr id="7" name="Straight Arrow Connector 6"/>
+            <p:cNvCxnSpPr>
+              <a:cxnSpLocks/>
+            </p:cNvCxnSpPr>
+            <p:nvPr/>
+          </p:nvCxnSpPr>
+          <p:spPr>
+            <a:xfrm flipV="1">
+              <a:off x="1481667" y="3445803"/>
+              <a:ext cx="5719850" cy="279531"/>
+            </a:xfrm>
+            <a:prstGeom prst="straightConnector1">
+              <a:avLst/>
+            </a:prstGeom>
+            <a:ln>
+              <a:tailEnd type="triangle"/>
+            </a:ln>
+          </p:spPr>
+          <p:style>
+            <a:lnRef idx="1">
+              <a:schemeClr val="accent1"/>
+            </a:lnRef>
+            <a:fillRef idx="0">
+              <a:schemeClr val="accent1"/>
+            </a:fillRef>
+            <a:effectRef idx="0">
+              <a:schemeClr val="accent1"/>
+            </a:effectRef>
+            <a:fontRef idx="minor">
+              <a:schemeClr val="tx1"/>
+            </a:fontRef>
+          </p:style>
+        </p:cxnSp>
+        <p:cxnSp>
+          <p:nvCxnSpPr>
+            <p:cNvPr id="8" name="Straight Arrow Connector 7"/>
+            <p:cNvCxnSpPr>
+              <a:cxnSpLocks/>
+            </p:cNvCxnSpPr>
+            <p:nvPr/>
+          </p:nvCxnSpPr>
+          <p:spPr>
+            <a:xfrm>
+              <a:off x="1481667" y="3725333"/>
+              <a:ext cx="740636" cy="18793"/>
+            </a:xfrm>
+            <a:prstGeom prst="straightConnector1">
+              <a:avLst/>
+            </a:prstGeom>
+            <a:ln>
+              <a:tailEnd type="triangle"/>
+            </a:ln>
+          </p:spPr>
+          <p:style>
+            <a:lnRef idx="1">
+              <a:schemeClr val="accent1"/>
+            </a:lnRef>
+            <a:fillRef idx="0">
+              <a:schemeClr val="accent1"/>
+            </a:fillRef>
+            <a:effectRef idx="0">
+              <a:schemeClr val="accent1"/>
+            </a:effectRef>
+            <a:fontRef idx="minor">
+              <a:schemeClr val="tx1"/>
+            </a:fontRef>
+          </p:style>
+        </p:cxnSp>
+        <p:cxnSp>
+          <p:nvCxnSpPr>
+            <p:cNvPr id="9" name="Straight Arrow Connector 8"/>
+            <p:cNvCxnSpPr>
+              <a:cxnSpLocks/>
+            </p:cNvCxnSpPr>
+            <p:nvPr/>
+          </p:nvCxnSpPr>
+          <p:spPr>
+            <a:xfrm>
+              <a:off x="1481667" y="3725333"/>
+              <a:ext cx="3257013" cy="346642"/>
+            </a:xfrm>
+            <a:prstGeom prst="straightConnector1">
+              <a:avLst/>
+            </a:prstGeom>
+            <a:ln>
+              <a:tailEnd type="triangle"/>
+            </a:ln>
+          </p:spPr>
+          <p:style>
+            <a:lnRef idx="1">
+              <a:schemeClr val="accent1"/>
+            </a:lnRef>
+            <a:fillRef idx="0">
+              <a:schemeClr val="accent1"/>
+            </a:fillRef>
+            <a:effectRef idx="0">
+              <a:schemeClr val="accent1"/>
+            </a:effectRef>
+            <a:fontRef idx="minor">
+              <a:schemeClr val="tx1"/>
+            </a:fontRef>
+          </p:style>
+        </p:cxnSp>
+      </p:grpSp>
+      <p:sp>
+        <p:nvSpPr>
+          <p:cNvPr id="10" name="TextBox 9"/>
+          <p:cNvSpPr txBox="1"/>
+          <p:nvPr/>
+        </p:nvSpPr>
+        <p:spPr>
+          <a:xfrm>
+            <a:off x="648474" y="3342105"/>
+            <a:ext cx="1137994" cy="584775"/>
+          </a:xfrm>
+          <a:prstGeom prst="rect">
+            <a:avLst/>
+          </a:prstGeom>
+          <a:noFill/>
+        </p:spPr>
+        <p:txBody>
+          <a:bodyPr wrap="square" rtlCol="0">
+            <a:spAutoFit/>
+          </a:bodyPr>
+          <a:lstStyle/>
+          <a:p>
+            <a:r>
+              <a:rPr lang="en-GB" sz="1600" dirty="0">
+                <a:latin typeface="+mj-lt"/>
+              </a:rPr>
+              <a:t>Artwork</a:t>
+            </a:r>
+          </a:p>
+          <a:p>
+            <a:r>
+              <a:rPr lang="en-GB" sz="1600" dirty="0">
+                <a:latin typeface="+mj-lt"/>
+              </a:rPr>
+              <a:t>categories</a:t>
+            </a:r>
+          </a:p>
+        </p:txBody>
+      </p:sp>
+      <p:cxnSp>
+        <p:nvCxnSpPr>
+          <p:cNvPr id="11" name="Straight Arrow Connector 10"/>
+          <p:cNvCxnSpPr>
+            <a:cxnSpLocks/>
+          </p:cNvCxnSpPr>
+          <p:nvPr/>
+        </p:nvCxnSpPr>
+        <p:spPr>
+          <a:xfrm flipV="1">
+            <a:off x="1748755" y="1174829"/>
+            <a:ext cx="461795" cy="472171"/>
+          </a:xfrm>
+          <a:prstGeom prst="straightConnector1">
+            <a:avLst/>
+          </a:prstGeom>
+          <a:ln>
+            <a:tailEnd type="triangle"/>
+          </a:ln>
+        </p:spPr>
+        <p:style>
+          <a:lnRef idx="1">
+            <a:schemeClr val="accent1"/>
+          </a:lnRef>
+          <a:fillRef idx="0">
+            <a:schemeClr val="accent1"/>
+          </a:fillRef>
+          <a:effectRef idx="0">
+            <a:schemeClr val="accent1"/>
+          </a:effectRef>
+          <a:fontRef idx="minor">
+            <a:schemeClr val="tx1"/>
+          </a:fontRef>
+        </p:style>
+      </p:cxnSp>
+      <p:cxnSp>
+        <p:nvCxnSpPr>
+          <p:cNvPr id="12" name="Straight Arrow Connector 11"/>
+          <p:cNvCxnSpPr>
+            <a:cxnSpLocks/>
+          </p:cNvCxnSpPr>
+          <p:nvPr/>
+        </p:nvCxnSpPr>
+        <p:spPr>
+          <a:xfrm flipV="1">
+            <a:off x="1972735" y="874191"/>
+            <a:ext cx="3208682" cy="1660358"/>
+          </a:xfrm>
+          <a:prstGeom prst="straightConnector1">
+            <a:avLst/>
+          </a:prstGeom>
+          <a:ln>
+            <a:tailEnd type="triangle"/>
+          </a:ln>
+        </p:spPr>
+        <p:style>
+          <a:lnRef idx="1">
+            <a:schemeClr val="accent1"/>
+          </a:lnRef>
+          <a:fillRef idx="0">
+            <a:schemeClr val="accent1"/>
+          </a:fillRef>
+          <a:effectRef idx="0">
+            <a:schemeClr val="accent1"/>
+          </a:effectRef>
+          <a:fontRef idx="minor">
+            <a:schemeClr val="tx1"/>
+          </a:fontRef>
+        </p:style>
+      </p:cxnSp>
+      <p:sp>
+        <p:nvSpPr>
+          <p:cNvPr id="13" name="TextBox 12"/>
+          <p:cNvSpPr txBox="1"/>
+          <p:nvPr/>
+        </p:nvSpPr>
+        <p:spPr>
+          <a:xfrm>
+            <a:off x="485061" y="2447050"/>
+            <a:ext cx="1742619" cy="338554"/>
+          </a:xfrm>
+          <a:prstGeom prst="rect">
+            <a:avLst/>
+          </a:prstGeom>
+          <a:noFill/>
+        </p:spPr>
+        <p:txBody>
+          <a:bodyPr wrap="square" rtlCol="0">
+            <a:spAutoFit/>
+          </a:bodyPr>
+          <a:lstStyle/>
+          <a:p>
+            <a:r>
+              <a:rPr lang="en-GB" sz="1600" dirty="0">
+                <a:latin typeface="+mj-lt"/>
+              </a:rPr>
+              <a:t>Navigation bar</a:t>
+            </a:r>
+          </a:p>
+        </p:txBody>
+      </p:sp>
+      <p:sp>
+        <p:nvSpPr>
+          <p:cNvPr id="14" name="TextBox 13"/>
+          <p:cNvSpPr txBox="1"/>
+          <p:nvPr/>
+        </p:nvSpPr>
+        <p:spPr>
+          <a:xfrm>
+            <a:off x="573952" y="1587003"/>
+            <a:ext cx="1742619" cy="338554"/>
+          </a:xfrm>
+          <a:prstGeom prst="rect">
+            <a:avLst/>
+          </a:prstGeom>
+          <a:noFill/>
+        </p:spPr>
+        <p:txBody>
+          <a:bodyPr wrap="square" rtlCol="0">
+            <a:spAutoFit/>
+          </a:bodyPr>
+          <a:lstStyle/>
+          <a:p>
+            <a:r>
+              <a:rPr lang="en-GB" sz="1600" dirty="0">
+                <a:latin typeface="+mj-lt"/>
+              </a:rPr>
+              <a:t>Artbud logo</a:t>
+            </a:r>
+          </a:p>
+        </p:txBody>
+      </p:sp>
+      <p:grpSp>
+        <p:nvGrpSpPr>
+          <p:cNvPr id="15" name="Group 14"/>
+          <p:cNvGrpSpPr/>
+          <p:nvPr/>
+        </p:nvGrpSpPr>
+        <p:grpSpPr>
+          <a:xfrm>
+            <a:off x="2201335" y="5088470"/>
+            <a:ext cx="5012267" cy="792706"/>
+            <a:chOff x="1794933" y="5190067"/>
+            <a:chExt cx="5467203" cy="693618"/>
+          </a:xfrm>
+        </p:grpSpPr>
+        <p:cxnSp>
+          <p:nvCxnSpPr>
+            <p:cNvPr id="16" name="Straight Arrow Connector 15"/>
+            <p:cNvCxnSpPr>
+              <a:cxnSpLocks/>
+            </p:cNvCxnSpPr>
+            <p:nvPr/>
+          </p:nvCxnSpPr>
+          <p:spPr>
+            <a:xfrm>
+              <a:off x="1794933" y="5190067"/>
+              <a:ext cx="570075" cy="455103"/>
+            </a:xfrm>
+            <a:prstGeom prst="straightConnector1">
+              <a:avLst/>
+            </a:prstGeom>
+            <a:ln>
+              <a:tailEnd type="triangle"/>
+            </a:ln>
+          </p:spPr>
+          <p:style>
+            <a:lnRef idx="1">
+              <a:schemeClr val="accent1"/>
+            </a:lnRef>
+            <a:fillRef idx="0">
+              <a:schemeClr val="accent1"/>
+            </a:fillRef>
+            <a:effectRef idx="0">
+              <a:schemeClr val="accent1"/>
+            </a:effectRef>
+            <a:fontRef idx="minor">
+              <a:schemeClr val="tx1"/>
+            </a:fontRef>
+          </p:style>
+        </p:cxnSp>
+        <p:cxnSp>
+          <p:nvCxnSpPr>
+            <p:cNvPr id="17" name="Straight Arrow Connector 16"/>
+            <p:cNvCxnSpPr>
+              <a:cxnSpLocks/>
+            </p:cNvCxnSpPr>
+            <p:nvPr/>
+          </p:nvCxnSpPr>
+          <p:spPr>
+            <a:xfrm>
+              <a:off x="1804984" y="5190067"/>
+              <a:ext cx="3240516" cy="693618"/>
+            </a:xfrm>
+            <a:prstGeom prst="straightConnector1">
+              <a:avLst/>
+            </a:prstGeom>
+            <a:ln>
+              <a:tailEnd type="triangle"/>
+            </a:ln>
+          </p:spPr>
+          <p:style>
+            <a:lnRef idx="1">
+              <a:schemeClr val="accent1"/>
+            </a:lnRef>
+            <a:fillRef idx="0">
+              <a:schemeClr val="accent1"/>
+            </a:fillRef>
+            <a:effectRef idx="0">
+              <a:schemeClr val="accent1"/>
+            </a:effectRef>
+            <a:fontRef idx="minor">
+              <a:schemeClr val="tx1"/>
+            </a:fontRef>
+          </p:style>
+        </p:cxnSp>
+        <p:cxnSp>
+          <p:nvCxnSpPr>
+            <p:cNvPr id="18" name="Straight Arrow Connector 17"/>
+            <p:cNvCxnSpPr>
+              <a:cxnSpLocks/>
+            </p:cNvCxnSpPr>
+            <p:nvPr/>
+          </p:nvCxnSpPr>
+          <p:spPr>
+            <a:xfrm>
+              <a:off x="1804984" y="5190067"/>
+              <a:ext cx="5457152" cy="693615"/>
+            </a:xfrm>
+            <a:prstGeom prst="straightConnector1">
+              <a:avLst/>
+            </a:prstGeom>
+            <a:ln>
+              <a:tailEnd type="triangle"/>
+            </a:ln>
+          </p:spPr>
+          <p:style>
+            <a:lnRef idx="1">
+              <a:schemeClr val="accent1"/>
+            </a:lnRef>
+            <a:fillRef idx="0">
+              <a:schemeClr val="accent1"/>
+            </a:fillRef>
+            <a:effectRef idx="0">
+              <a:schemeClr val="accent1"/>
+            </a:effectRef>
+            <a:fontRef idx="minor">
+              <a:schemeClr val="tx1"/>
+            </a:fontRef>
+          </p:style>
+        </p:cxnSp>
+      </p:grpSp>
+      <p:sp>
+        <p:nvSpPr>
+          <p:cNvPr id="19" name="TextBox 18"/>
+          <p:cNvSpPr txBox="1"/>
+          <p:nvPr/>
+        </p:nvSpPr>
+        <p:spPr>
+          <a:xfrm>
+            <a:off x="572214" y="4554308"/>
+            <a:ext cx="1916988" cy="830997"/>
+          </a:xfrm>
+          <a:prstGeom prst="rect">
+            <a:avLst/>
+          </a:prstGeom>
+          <a:noFill/>
+        </p:spPr>
+        <p:txBody>
+          <a:bodyPr wrap="square" rtlCol="0">
+            <a:spAutoFit/>
+          </a:bodyPr>
+          <a:lstStyle/>
+          <a:p>
+            <a:r>
+              <a:rPr lang="en-GB" sz="1600" dirty="0">
+                <a:latin typeface="+mj-lt"/>
+              </a:rPr>
+              <a:t>Footer with tweets, about section </a:t>
+            </a:r>
+            <a:br>
+              <a:rPr lang="en-GB" sz="1600" dirty="0">
+                <a:latin typeface="+mj-lt"/>
+              </a:rPr>
+            </a:br>
+            <a:r>
+              <a:rPr lang="en-GB" sz="1600" dirty="0">
+                <a:latin typeface="+mj-lt"/>
+              </a:rPr>
+              <a:t>and contact</a:t>
+            </a:r>
+          </a:p>
+        </p:txBody>
+      </p:sp>
+      <p:sp>
+        <p:nvSpPr>
+          <p:cNvPr id="29" name="TextBox 28"/>
+          <p:cNvSpPr txBox="1"/>
+          <p:nvPr/>
+        </p:nvSpPr>
+        <p:spPr>
+          <a:xfrm>
+            <a:off x="185487" y="247660"/>
+            <a:ext cx="2538486" cy="707886"/>
+          </a:xfrm>
+          <a:prstGeom prst="rect">
+            <a:avLst/>
+          </a:prstGeom>
+          <a:noFill/>
+        </p:spPr>
+        <p:txBody>
+          <a:bodyPr wrap="square" rtlCol="0">
+            <a:spAutoFit/>
+          </a:bodyPr>
+          <a:lstStyle/>
+          <a:p>
+            <a:r>
+              <a:rPr lang="en-GB" sz="2000" dirty="0"/>
+              <a:t>Actual category</a:t>
+            </a:r>
+          </a:p>
+          <a:p>
+            <a:r>
+              <a:rPr lang="en-GB" sz="2000" dirty="0"/>
+              <a:t>Page from app</a:t>
+            </a:r>
+          </a:p>
+        </p:txBody>
+      </p:sp>
     </p:spTree>
     <p:extLst>
       <p:ext uri="{BB962C8B-B14F-4D97-AF65-F5344CB8AC3E}">

</xml_diff>

<commit_message>
Added rest of wireframes
</commit_message>
<xml_diff>
--- a/presentation_material/powerpoint.pptx
+++ b/presentation_material/powerpoint.pptx
@@ -11,6 +11,10 @@
     <p:sldId id="263" r:id="rId5"/>
     <p:sldId id="258" r:id="rId6"/>
     <p:sldId id="259" r:id="rId7"/>
+    <p:sldId id="264" r:id="rId8"/>
+    <p:sldId id="266" r:id="rId9"/>
+    <p:sldId id="265" r:id="rId10"/>
+    <p:sldId id="267" r:id="rId11"/>
   </p:sldIdLst>
   <p:sldSz cx="9144000" cy="6858000" type="screen4x3"/>
   <p:notesSz cx="6858000" cy="9144000"/>
@@ -1496,7 +1500,7 @@
           <a:p>
             <a:fld id="{9447333A-8542-4DEB-A96F-D63023230355}" type="datetimeFigureOut">
               <a:rPr lang="en-GB" smtClean="0"/>
-              <a:t>22/03/2017</a:t>
+              <a:t>23/03/2017</a:t>
             </a:fld>
             <a:endParaRPr lang="en-GB"/>
           </a:p>
@@ -1762,7 +1766,7 @@
           <a:p>
             <a:fld id="{9447333A-8542-4DEB-A96F-D63023230355}" type="datetimeFigureOut">
               <a:rPr lang="en-GB" smtClean="0"/>
-              <a:t>22/03/2017</a:t>
+              <a:t>23/03/2017</a:t>
             </a:fld>
             <a:endParaRPr lang="en-GB"/>
           </a:p>
@@ -2012,7 +2016,7 @@
           <a:p>
             <a:fld id="{9447333A-8542-4DEB-A96F-D63023230355}" type="datetimeFigureOut">
               <a:rPr lang="en-GB" smtClean="0"/>
-              <a:t>22/03/2017</a:t>
+              <a:t>23/03/2017</a:t>
             </a:fld>
             <a:endParaRPr lang="en-GB"/>
           </a:p>
@@ -2320,7 +2324,7 @@
           <a:p>
             <a:fld id="{9447333A-8542-4DEB-A96F-D63023230355}" type="datetimeFigureOut">
               <a:rPr lang="en-GB" smtClean="0"/>
-              <a:t>22/03/2017</a:t>
+              <a:t>23/03/2017</a:t>
             </a:fld>
             <a:endParaRPr lang="en-GB"/>
           </a:p>
@@ -2638,7 +2642,7 @@
           <a:p>
             <a:fld id="{9447333A-8542-4DEB-A96F-D63023230355}" type="datetimeFigureOut">
               <a:rPr lang="en-GB" smtClean="0"/>
-              <a:t>22/03/2017</a:t>
+              <a:t>23/03/2017</a:t>
             </a:fld>
             <a:endParaRPr lang="en-GB"/>
           </a:p>
@@ -2940,7 +2944,7 @@
           <a:p>
             <a:fld id="{9447333A-8542-4DEB-A96F-D63023230355}" type="datetimeFigureOut">
               <a:rPr lang="en-GB" smtClean="0"/>
-              <a:t>22/03/2017</a:t>
+              <a:t>23/03/2017</a:t>
             </a:fld>
             <a:endParaRPr lang="en-GB"/>
           </a:p>
@@ -3307,7 +3311,7 @@
           <a:p>
             <a:fld id="{9447333A-8542-4DEB-A96F-D63023230355}" type="datetimeFigureOut">
               <a:rPr lang="en-GB" smtClean="0"/>
-              <a:t>22/03/2017</a:t>
+              <a:t>23/03/2017</a:t>
             </a:fld>
             <a:endParaRPr lang="en-GB"/>
           </a:p>
@@ -3493,7 +3497,7 @@
           <a:p>
             <a:fld id="{9447333A-8542-4DEB-A96F-D63023230355}" type="datetimeFigureOut">
               <a:rPr lang="en-GB" smtClean="0"/>
-              <a:t>22/03/2017</a:t>
+              <a:t>23/03/2017</a:t>
             </a:fld>
             <a:endParaRPr lang="en-GB"/>
           </a:p>
@@ -3679,7 +3683,7 @@
           <a:p>
             <a:fld id="{9447333A-8542-4DEB-A96F-D63023230355}" type="datetimeFigureOut">
               <a:rPr lang="en-GB" smtClean="0"/>
-              <a:t>22/03/2017</a:t>
+              <a:t>23/03/2017</a:t>
             </a:fld>
             <a:endParaRPr lang="en-GB"/>
           </a:p>
@@ -3859,7 +3863,7 @@
           <a:p>
             <a:fld id="{9447333A-8542-4DEB-A96F-D63023230355}" type="datetimeFigureOut">
               <a:rPr lang="en-GB" smtClean="0"/>
-              <a:t>22/03/2017</a:t>
+              <a:t>23/03/2017</a:t>
             </a:fld>
             <a:endParaRPr lang="en-GB"/>
           </a:p>
@@ -4109,7 +4113,7 @@
           <a:p>
             <a:fld id="{9447333A-8542-4DEB-A96F-D63023230355}" type="datetimeFigureOut">
               <a:rPr lang="en-GB" smtClean="0"/>
-              <a:t>22/03/2017</a:t>
+              <a:t>23/03/2017</a:t>
             </a:fld>
             <a:endParaRPr lang="en-GB"/>
           </a:p>
@@ -4356,7 +4360,7 @@
           <a:p>
             <a:fld id="{9447333A-8542-4DEB-A96F-D63023230355}" type="datetimeFigureOut">
               <a:rPr lang="en-GB" smtClean="0"/>
-              <a:t>22/03/2017</a:t>
+              <a:t>23/03/2017</a:t>
             </a:fld>
             <a:endParaRPr lang="en-GB"/>
           </a:p>
@@ -4745,7 +4749,7 @@
           <a:p>
             <a:fld id="{9447333A-8542-4DEB-A96F-D63023230355}" type="datetimeFigureOut">
               <a:rPr lang="en-GB" smtClean="0"/>
-              <a:t>22/03/2017</a:t>
+              <a:t>23/03/2017</a:t>
             </a:fld>
             <a:endParaRPr lang="en-GB"/>
           </a:p>
@@ -4874,7 +4878,7 @@
           <a:p>
             <a:fld id="{9447333A-8542-4DEB-A96F-D63023230355}" type="datetimeFigureOut">
               <a:rPr lang="en-GB" smtClean="0"/>
-              <a:t>22/03/2017</a:t>
+              <a:t>23/03/2017</a:t>
             </a:fld>
             <a:endParaRPr lang="en-GB"/>
           </a:p>
@@ -4969,7 +4973,7 @@
           <a:p>
             <a:fld id="{9447333A-8542-4DEB-A96F-D63023230355}" type="datetimeFigureOut">
               <a:rPr lang="en-GB" smtClean="0"/>
-              <a:t>22/03/2017</a:t>
+              <a:t>23/03/2017</a:t>
             </a:fld>
             <a:endParaRPr lang="en-GB"/>
           </a:p>
@@ -5224,7 +5228,7 @@
           <a:p>
             <a:fld id="{9447333A-8542-4DEB-A96F-D63023230355}" type="datetimeFigureOut">
               <a:rPr lang="en-GB" smtClean="0"/>
-              <a:t>22/03/2017</a:t>
+              <a:t>23/03/2017</a:t>
             </a:fld>
             <a:endParaRPr lang="en-GB"/>
           </a:p>
@@ -5507,7 +5511,7 @@
           <a:p>
             <a:fld id="{9447333A-8542-4DEB-A96F-D63023230355}" type="datetimeFigureOut">
               <a:rPr lang="en-GB" smtClean="0"/>
-              <a:t>22/03/2017</a:t>
+              <a:t>23/03/2017</a:t>
             </a:fld>
             <a:endParaRPr lang="en-GB"/>
           </a:p>
@@ -5918,7 +5922,7 @@
           <a:p>
             <a:fld id="{9447333A-8542-4DEB-A96F-D63023230355}" type="datetimeFigureOut">
               <a:rPr lang="en-GB" smtClean="0"/>
-              <a:t>22/03/2017</a:t>
+              <a:t>23/03/2017</a:t>
             </a:fld>
             <a:endParaRPr lang="en-GB"/>
           </a:p>
@@ -6780,6 +6784,263 @@
 </p:sld>
 </file>
 
+<file path=ppt/slides/slide10.xml><?xml version="1.0" encoding="utf-8"?>
+<p:sld xmlns:a="http://schemas.openxmlformats.org/drawingml/2006/main" xmlns:r="http://schemas.openxmlformats.org/officeDocument/2006/relationships" xmlns:p="http://schemas.openxmlformats.org/presentationml/2006/main">
+  <p:cSld>
+    <p:spTree>
+      <p:nvGrpSpPr>
+        <p:cNvPr id="1" name=""/>
+        <p:cNvGrpSpPr/>
+        <p:nvPr/>
+      </p:nvGrpSpPr>
+      <p:grpSpPr>
+        <a:xfrm>
+          <a:off x="0" y="0"/>
+          <a:ext cx="0" cy="0"/>
+          <a:chOff x="0" y="0"/>
+          <a:chExt cx="0" cy="0"/>
+        </a:xfrm>
+      </p:grpSpPr>
+      <p:pic>
+        <p:nvPicPr>
+          <p:cNvPr id="4" name="Picture 3"/>
+          <p:cNvPicPr>
+            <a:picLocks noChangeAspect="1"/>
+          </p:cNvPicPr>
+          <p:nvPr/>
+        </p:nvPicPr>
+        <p:blipFill>
+          <a:blip r:embed="rId2"/>
+          <a:stretch>
+            <a:fillRect/>
+          </a:stretch>
+        </p:blipFill>
+        <p:spPr>
+          <a:xfrm>
+            <a:off x="2227798" y="0"/>
+            <a:ext cx="6707354" cy="6858000"/>
+          </a:xfrm>
+          <a:prstGeom prst="rect">
+            <a:avLst/>
+          </a:prstGeom>
+        </p:spPr>
+      </p:pic>
+      <p:sp>
+        <p:nvSpPr>
+          <p:cNvPr id="5" name="TextBox 4"/>
+          <p:cNvSpPr txBox="1"/>
+          <p:nvPr/>
+        </p:nvSpPr>
+        <p:spPr>
+          <a:xfrm>
+            <a:off x="101643" y="148827"/>
+            <a:ext cx="2229444" cy="646331"/>
+          </a:xfrm>
+          <a:prstGeom prst="rect">
+            <a:avLst/>
+          </a:prstGeom>
+          <a:noFill/>
+        </p:spPr>
+        <p:txBody>
+          <a:bodyPr wrap="square" rtlCol="0">
+            <a:spAutoFit/>
+          </a:bodyPr>
+          <a:lstStyle/>
+          <a:p>
+            <a:r>
+              <a:rPr lang="en-GB" dirty="0"/>
+              <a:t>Home page from app</a:t>
+            </a:r>
+          </a:p>
+        </p:txBody>
+      </p:sp>
+      <p:sp>
+        <p:nvSpPr>
+          <p:cNvPr id="6" name="TextBox 5"/>
+          <p:cNvSpPr txBox="1"/>
+          <p:nvPr/>
+        </p:nvSpPr>
+        <p:spPr>
+          <a:xfrm>
+            <a:off x="211628" y="1484068"/>
+            <a:ext cx="1742619" cy="323165"/>
+          </a:xfrm>
+          <a:prstGeom prst="rect">
+            <a:avLst/>
+          </a:prstGeom>
+          <a:noFill/>
+        </p:spPr>
+        <p:txBody>
+          <a:bodyPr wrap="square" rtlCol="0">
+            <a:spAutoFit/>
+          </a:bodyPr>
+          <a:lstStyle/>
+          <a:p>
+            <a:r>
+              <a:rPr lang="en-GB" sz="1500" dirty="0">
+                <a:latin typeface="+mj-lt"/>
+              </a:rPr>
+              <a:t>Artbud logo</a:t>
+            </a:r>
+          </a:p>
+        </p:txBody>
+      </p:sp>
+      <p:sp>
+        <p:nvSpPr>
+          <p:cNvPr id="7" name="TextBox 6"/>
+          <p:cNvSpPr txBox="1"/>
+          <p:nvPr/>
+        </p:nvSpPr>
+        <p:spPr>
+          <a:xfrm>
+            <a:off x="211628" y="2234653"/>
+            <a:ext cx="1742619" cy="307777"/>
+          </a:xfrm>
+          <a:prstGeom prst="rect">
+            <a:avLst/>
+          </a:prstGeom>
+          <a:noFill/>
+        </p:spPr>
+        <p:txBody>
+          <a:bodyPr wrap="square" rtlCol="0">
+            <a:spAutoFit/>
+          </a:bodyPr>
+          <a:lstStyle/>
+          <a:p>
+            <a:r>
+              <a:rPr lang="en-GB" sz="1400" dirty="0">
+                <a:latin typeface="+mj-lt"/>
+              </a:rPr>
+              <a:t>Navigation bar</a:t>
+            </a:r>
+          </a:p>
+        </p:txBody>
+      </p:sp>
+      <p:sp>
+        <p:nvSpPr>
+          <p:cNvPr id="8" name="TextBox 7"/>
+          <p:cNvSpPr txBox="1"/>
+          <p:nvPr/>
+        </p:nvSpPr>
+        <p:spPr>
+          <a:xfrm>
+            <a:off x="211628" y="5280567"/>
+            <a:ext cx="2129004" cy="738664"/>
+          </a:xfrm>
+          <a:prstGeom prst="rect">
+            <a:avLst/>
+          </a:prstGeom>
+          <a:noFill/>
+        </p:spPr>
+        <p:txBody>
+          <a:bodyPr wrap="square" rtlCol="0">
+            <a:spAutoFit/>
+          </a:bodyPr>
+          <a:lstStyle/>
+          <a:p>
+            <a:r>
+              <a:rPr lang="en-GB" sz="1400" dirty="0">
+                <a:latin typeface="+mj-lt"/>
+              </a:rPr>
+              <a:t>Footer with tweets, about section,</a:t>
+            </a:r>
+            <a:br>
+              <a:rPr lang="en-GB" sz="1400" dirty="0">
+                <a:latin typeface="+mj-lt"/>
+              </a:rPr>
+            </a:br>
+            <a:r>
+              <a:rPr lang="en-GB" sz="1400" dirty="0">
+                <a:latin typeface="+mj-lt"/>
+              </a:rPr>
+              <a:t>and contact</a:t>
+            </a:r>
+          </a:p>
+        </p:txBody>
+      </p:sp>
+      <p:sp>
+        <p:nvSpPr>
+          <p:cNvPr id="9" name="TextBox 8"/>
+          <p:cNvSpPr txBox="1"/>
+          <p:nvPr/>
+        </p:nvSpPr>
+        <p:spPr>
+          <a:xfrm>
+            <a:off x="211628" y="3237604"/>
+            <a:ext cx="1742619" cy="523220"/>
+          </a:xfrm>
+          <a:prstGeom prst="rect">
+            <a:avLst/>
+          </a:prstGeom>
+          <a:noFill/>
+        </p:spPr>
+        <p:txBody>
+          <a:bodyPr wrap="square" rtlCol="0">
+            <a:spAutoFit/>
+          </a:bodyPr>
+          <a:lstStyle/>
+          <a:p>
+            <a:r>
+              <a:rPr lang="en-GB" sz="1400" dirty="0">
+                <a:latin typeface="+mj-lt"/>
+              </a:rPr>
+              <a:t>Main Page Picture</a:t>
+            </a:r>
+          </a:p>
+        </p:txBody>
+      </p:sp>
+      <p:sp>
+        <p:nvSpPr>
+          <p:cNvPr id="10" name="TextBox 9"/>
+          <p:cNvSpPr txBox="1"/>
+          <p:nvPr/>
+        </p:nvSpPr>
+        <p:spPr>
+          <a:xfrm>
+            <a:off x="211627" y="4176038"/>
+            <a:ext cx="1742619" cy="738664"/>
+          </a:xfrm>
+          <a:prstGeom prst="rect">
+            <a:avLst/>
+          </a:prstGeom>
+          <a:noFill/>
+        </p:spPr>
+        <p:txBody>
+          <a:bodyPr wrap="square" rtlCol="0">
+            <a:spAutoFit/>
+          </a:bodyPr>
+          <a:lstStyle/>
+          <a:p>
+            <a:r>
+              <a:rPr lang="en-GB" sz="1400" dirty="0">
+                <a:latin typeface="+mj-lt"/>
+              </a:rPr>
+              <a:t>To be implemented </a:t>
+            </a:r>
+          </a:p>
+          <a:p>
+            <a:r>
+              <a:rPr lang="en-GB" sz="1400" dirty="0">
+                <a:latin typeface="+mj-lt"/>
+              </a:rPr>
+              <a:t>Best and New Art</a:t>
+            </a:r>
+          </a:p>
+        </p:txBody>
+      </p:sp>
+    </p:spTree>
+    <p:extLst>
+      <p:ext uri="{BB962C8B-B14F-4D97-AF65-F5344CB8AC3E}">
+        <p14:creationId xmlns:p14="http://schemas.microsoft.com/office/powerpoint/2010/main" val="2173261545"/>
+      </p:ext>
+    </p:extLst>
+  </p:cSld>
+  <p:clrMapOvr>
+    <a:masterClrMapping/>
+  </p:clrMapOvr>
+</p:sld>
+</file>
+
 <file path=ppt/slides/slide2.xml><?xml version="1.0" encoding="utf-8"?>
 <p:sld xmlns:a="http://schemas.openxmlformats.org/drawingml/2006/main" xmlns:r="http://schemas.openxmlformats.org/officeDocument/2006/relationships" xmlns:p="http://schemas.openxmlformats.org/presentationml/2006/main">
   <p:cSld>
@@ -7178,219 +7439,6 @@
           </p:txBody>
         </p:sp>
       </p:grpSp>
-      <p:grpSp>
-        <p:nvGrpSpPr>
-          <p:cNvPr id="5" name="Group 4"/>
-          <p:cNvGrpSpPr/>
-          <p:nvPr/>
-        </p:nvGrpSpPr>
-        <p:grpSpPr>
-          <a:xfrm>
-            <a:off x="1818935" y="2438045"/>
-            <a:ext cx="5808134" cy="1857324"/>
-            <a:chOff x="1481667" y="2497667"/>
-            <a:chExt cx="6121400" cy="1761066"/>
-          </a:xfrm>
-        </p:grpSpPr>
-        <p:cxnSp>
-          <p:nvCxnSpPr>
-            <p:cNvPr id="6" name="Straight Arrow Connector 5"/>
-            <p:cNvCxnSpPr>
-              <a:cxnSpLocks/>
-            </p:cNvCxnSpPr>
-            <p:nvPr/>
-          </p:nvCxnSpPr>
-          <p:spPr>
-            <a:xfrm flipV="1">
-              <a:off x="1481667" y="2523068"/>
-              <a:ext cx="1820333" cy="1202265"/>
-            </a:xfrm>
-            <a:prstGeom prst="straightConnector1">
-              <a:avLst/>
-            </a:prstGeom>
-            <a:ln w="12700">
-              <a:solidFill>
-                <a:schemeClr val="bg1">
-                  <a:alpha val="60000"/>
-                </a:schemeClr>
-              </a:solidFill>
-              <a:tailEnd type="triangle"/>
-            </a:ln>
-          </p:spPr>
-          <p:style>
-            <a:lnRef idx="1">
-              <a:schemeClr val="accent1"/>
-            </a:lnRef>
-            <a:fillRef idx="0">
-              <a:schemeClr val="accent1"/>
-            </a:fillRef>
-            <a:effectRef idx="0">
-              <a:schemeClr val="accent1"/>
-            </a:effectRef>
-            <a:fontRef idx="minor">
-              <a:schemeClr val="tx1"/>
-            </a:fontRef>
-          </p:style>
-        </p:cxnSp>
-        <p:cxnSp>
-          <p:nvCxnSpPr>
-            <p:cNvPr id="7" name="Straight Arrow Connector 6"/>
-            <p:cNvCxnSpPr>
-              <a:cxnSpLocks/>
-            </p:cNvCxnSpPr>
-            <p:nvPr/>
-          </p:nvCxnSpPr>
-          <p:spPr>
-            <a:xfrm flipV="1">
-              <a:off x="1481667" y="2497667"/>
-              <a:ext cx="4055533" cy="1227666"/>
-            </a:xfrm>
-            <a:prstGeom prst="straightConnector1">
-              <a:avLst/>
-            </a:prstGeom>
-            <a:ln w="12700">
-              <a:solidFill>
-                <a:schemeClr val="bg1">
-                  <a:alpha val="60000"/>
-                </a:schemeClr>
-              </a:solidFill>
-              <a:tailEnd type="triangle"/>
-            </a:ln>
-          </p:spPr>
-          <p:style>
-            <a:lnRef idx="1">
-              <a:schemeClr val="accent1"/>
-            </a:lnRef>
-            <a:fillRef idx="0">
-              <a:schemeClr val="accent1"/>
-            </a:fillRef>
-            <a:effectRef idx="0">
-              <a:schemeClr val="accent1"/>
-            </a:effectRef>
-            <a:fontRef idx="minor">
-              <a:schemeClr val="tx1"/>
-            </a:fontRef>
-          </p:style>
-        </p:cxnSp>
-        <p:cxnSp>
-          <p:nvCxnSpPr>
-            <p:cNvPr id="8" name="Straight Arrow Connector 7"/>
-            <p:cNvCxnSpPr>
-              <a:cxnSpLocks/>
-            </p:cNvCxnSpPr>
-            <p:nvPr/>
-          </p:nvCxnSpPr>
-          <p:spPr>
-            <a:xfrm flipV="1">
-              <a:off x="1481667" y="2497667"/>
-              <a:ext cx="6121400" cy="1227666"/>
-            </a:xfrm>
-            <a:prstGeom prst="straightConnector1">
-              <a:avLst/>
-            </a:prstGeom>
-            <a:ln w="12700">
-              <a:solidFill>
-                <a:schemeClr val="bg1">
-                  <a:alpha val="60000"/>
-                </a:schemeClr>
-              </a:solidFill>
-              <a:tailEnd type="triangle"/>
-            </a:ln>
-          </p:spPr>
-          <p:style>
-            <a:lnRef idx="1">
-              <a:schemeClr val="accent1"/>
-            </a:lnRef>
-            <a:fillRef idx="0">
-              <a:schemeClr val="accent1"/>
-            </a:fillRef>
-            <a:effectRef idx="0">
-              <a:schemeClr val="accent1"/>
-            </a:effectRef>
-            <a:fontRef idx="minor">
-              <a:schemeClr val="tx1"/>
-            </a:fontRef>
-          </p:style>
-        </p:cxnSp>
-        <p:cxnSp>
-          <p:nvCxnSpPr>
-            <p:cNvPr id="9" name="Straight Arrow Connector 8"/>
-            <p:cNvCxnSpPr>
-              <a:cxnSpLocks/>
-            </p:cNvCxnSpPr>
-            <p:nvPr/>
-          </p:nvCxnSpPr>
-          <p:spPr>
-            <a:xfrm>
-              <a:off x="1481667" y="3725333"/>
-              <a:ext cx="2844800" cy="533400"/>
-            </a:xfrm>
-            <a:prstGeom prst="straightConnector1">
-              <a:avLst/>
-            </a:prstGeom>
-            <a:ln w="12700">
-              <a:solidFill>
-                <a:schemeClr val="bg1">
-                  <a:alpha val="60000"/>
-                </a:schemeClr>
-              </a:solidFill>
-              <a:tailEnd type="triangle"/>
-            </a:ln>
-          </p:spPr>
-          <p:style>
-            <a:lnRef idx="1">
-              <a:schemeClr val="accent1"/>
-            </a:lnRef>
-            <a:fillRef idx="0">
-              <a:schemeClr val="accent1"/>
-            </a:fillRef>
-            <a:effectRef idx="0">
-              <a:schemeClr val="accent1"/>
-            </a:effectRef>
-            <a:fontRef idx="minor">
-              <a:schemeClr val="tx1"/>
-            </a:fontRef>
-          </p:style>
-        </p:cxnSp>
-        <p:cxnSp>
-          <p:nvCxnSpPr>
-            <p:cNvPr id="10" name="Straight Arrow Connector 9"/>
-            <p:cNvCxnSpPr/>
-            <p:nvPr/>
-          </p:nvCxnSpPr>
-          <p:spPr>
-            <a:xfrm>
-              <a:off x="1481667" y="3725333"/>
-              <a:ext cx="5427133" cy="440267"/>
-            </a:xfrm>
-            <a:prstGeom prst="straightConnector1">
-              <a:avLst/>
-            </a:prstGeom>
-            <a:ln w="12700">
-              <a:solidFill>
-                <a:schemeClr val="bg1">
-                  <a:alpha val="60000"/>
-                </a:schemeClr>
-              </a:solidFill>
-              <a:tailEnd type="triangle"/>
-            </a:ln>
-          </p:spPr>
-          <p:style>
-            <a:lnRef idx="1">
-              <a:schemeClr val="accent1"/>
-            </a:lnRef>
-            <a:fillRef idx="0">
-              <a:schemeClr val="accent1"/>
-            </a:fillRef>
-            <a:effectRef idx="0">
-              <a:schemeClr val="accent1"/>
-            </a:effectRef>
-            <a:fontRef idx="minor">
-              <a:schemeClr val="tx1"/>
-            </a:fontRef>
-          </p:style>
-        </p:cxnSp>
-      </p:grpSp>
       <p:sp>
         <p:nvSpPr>
           <p:cNvPr id="11" name="TextBox 10"/>
@@ -7399,7 +7447,7 @@
         </p:nvSpPr>
         <p:spPr>
           <a:xfrm>
-            <a:off x="506740" y="3310310"/>
+            <a:off x="421187" y="3323031"/>
             <a:ext cx="1419761" cy="523220"/>
           </a:xfrm>
           <a:prstGeom prst="rect">
@@ -7430,86 +7478,6 @@
           </a:p>
         </p:txBody>
       </p:sp>
-      <p:cxnSp>
-        <p:nvCxnSpPr>
-          <p:cNvPr id="15" name="Straight Arrow Connector 14"/>
-          <p:cNvCxnSpPr>
-            <a:cxnSpLocks/>
-          </p:cNvCxnSpPr>
-          <p:nvPr/>
-        </p:nvCxnSpPr>
-        <p:spPr>
-          <a:xfrm flipV="1">
-            <a:off x="1741251" y="880784"/>
-            <a:ext cx="1105288" cy="529727"/>
-          </a:xfrm>
-          <a:prstGeom prst="straightConnector1">
-            <a:avLst/>
-          </a:prstGeom>
-          <a:ln w="12700">
-            <a:solidFill>
-              <a:schemeClr val="bg1">
-                <a:alpha val="60000"/>
-              </a:schemeClr>
-            </a:solidFill>
-            <a:tailEnd type="triangle"/>
-          </a:ln>
-        </p:spPr>
-        <p:style>
-          <a:lnRef idx="1">
-            <a:schemeClr val="accent1"/>
-          </a:lnRef>
-          <a:fillRef idx="0">
-            <a:schemeClr val="accent1"/>
-          </a:fillRef>
-          <a:effectRef idx="0">
-            <a:schemeClr val="accent1"/>
-          </a:effectRef>
-          <a:fontRef idx="minor">
-            <a:schemeClr val="tx1"/>
-          </a:fontRef>
-        </p:style>
-      </p:cxnSp>
-      <p:cxnSp>
-        <p:nvCxnSpPr>
-          <p:cNvPr id="16" name="Straight Arrow Connector 15"/>
-          <p:cNvCxnSpPr>
-            <a:cxnSpLocks/>
-          </p:cNvCxnSpPr>
-          <p:nvPr/>
-        </p:nvCxnSpPr>
-        <p:spPr>
-          <a:xfrm flipV="1">
-            <a:off x="2013626" y="865768"/>
-            <a:ext cx="2763917" cy="1245134"/>
-          </a:xfrm>
-          <a:prstGeom prst="straightConnector1">
-            <a:avLst/>
-          </a:prstGeom>
-          <a:ln w="12700">
-            <a:solidFill>
-              <a:schemeClr val="bg1">
-                <a:alpha val="60000"/>
-              </a:schemeClr>
-            </a:solidFill>
-            <a:tailEnd type="triangle"/>
-          </a:ln>
-        </p:spPr>
-        <p:style>
-          <a:lnRef idx="1">
-            <a:schemeClr val="accent1"/>
-          </a:lnRef>
-          <a:fillRef idx="0">
-            <a:schemeClr val="accent1"/>
-          </a:fillRef>
-          <a:effectRef idx="0">
-            <a:schemeClr val="accent1"/>
-          </a:effectRef>
-          <a:fontRef idx="minor">
-            <a:schemeClr val="tx1"/>
-          </a:fontRef>
-        </p:style>
-      </p:cxnSp>
       <p:sp>
         <p:nvSpPr>
           <p:cNvPr id="17" name="TextBox 16"/>
@@ -7549,7 +7517,7 @@
         </p:nvSpPr>
         <p:spPr>
           <a:xfrm>
-            <a:off x="483886" y="1308773"/>
+            <a:off x="421187" y="1333653"/>
             <a:ext cx="1742619" cy="307777"/>
           </a:xfrm>
           <a:prstGeom prst="rect">
@@ -7572,141 +7540,6 @@
           </a:p>
         </p:txBody>
       </p:sp>
-      <p:grpSp>
-        <p:nvGrpSpPr>
-          <p:cNvPr id="19" name="Group 18"/>
-          <p:cNvGrpSpPr/>
-          <p:nvPr/>
-        </p:nvGrpSpPr>
-        <p:grpSpPr>
-          <a:xfrm>
-            <a:off x="2325326" y="5186783"/>
-            <a:ext cx="4771759" cy="677332"/>
-            <a:chOff x="1794933" y="5190067"/>
-            <a:chExt cx="5204866" cy="592666"/>
-          </a:xfrm>
-        </p:grpSpPr>
-        <p:cxnSp>
-          <p:nvCxnSpPr>
-            <p:cNvPr id="20" name="Straight Arrow Connector 19"/>
-            <p:cNvCxnSpPr>
-              <a:cxnSpLocks/>
-            </p:cNvCxnSpPr>
-            <p:nvPr/>
-          </p:nvCxnSpPr>
-          <p:spPr>
-            <a:xfrm>
-              <a:off x="1794933" y="5190067"/>
-              <a:ext cx="1163440" cy="511679"/>
-            </a:xfrm>
-            <a:prstGeom prst="straightConnector1">
-              <a:avLst/>
-            </a:prstGeom>
-            <a:ln w="12700">
-              <a:solidFill>
-                <a:schemeClr val="bg1">
-                  <a:alpha val="60000"/>
-                </a:schemeClr>
-              </a:solidFill>
-              <a:tailEnd type="triangle"/>
-            </a:ln>
-          </p:spPr>
-          <p:style>
-            <a:lnRef idx="1">
-              <a:schemeClr val="accent1"/>
-            </a:lnRef>
-            <a:fillRef idx="0">
-              <a:schemeClr val="accent1"/>
-            </a:fillRef>
-            <a:effectRef idx="0">
-              <a:schemeClr val="accent1"/>
-            </a:effectRef>
-            <a:fontRef idx="minor">
-              <a:schemeClr val="tx1"/>
-            </a:fontRef>
-          </p:style>
-        </p:cxnSp>
-        <p:cxnSp>
-          <p:nvCxnSpPr>
-            <p:cNvPr id="21" name="Straight Arrow Connector 20"/>
-            <p:cNvCxnSpPr>
-              <a:cxnSpLocks/>
-            </p:cNvCxnSpPr>
-            <p:nvPr/>
-          </p:nvCxnSpPr>
-          <p:spPr>
-            <a:xfrm>
-              <a:off x="1804984" y="5190067"/>
-              <a:ext cx="3218326" cy="592666"/>
-            </a:xfrm>
-            <a:prstGeom prst="straightConnector1">
-              <a:avLst/>
-            </a:prstGeom>
-            <a:ln w="12700">
-              <a:solidFill>
-                <a:schemeClr val="bg1">
-                  <a:alpha val="60000"/>
-                </a:schemeClr>
-              </a:solidFill>
-              <a:tailEnd type="triangle"/>
-            </a:ln>
-          </p:spPr>
-          <p:style>
-            <a:lnRef idx="1">
-              <a:schemeClr val="accent1"/>
-            </a:lnRef>
-            <a:fillRef idx="0">
-              <a:schemeClr val="accent1"/>
-            </a:fillRef>
-            <a:effectRef idx="0">
-              <a:schemeClr val="accent1"/>
-            </a:effectRef>
-            <a:fontRef idx="minor">
-              <a:schemeClr val="tx1"/>
-            </a:fontRef>
-          </p:style>
-        </p:cxnSp>
-        <p:cxnSp>
-          <p:nvCxnSpPr>
-            <p:cNvPr id="22" name="Straight Arrow Connector 21"/>
-            <p:cNvCxnSpPr>
-              <a:cxnSpLocks/>
-            </p:cNvCxnSpPr>
-            <p:nvPr/>
-          </p:nvCxnSpPr>
-          <p:spPr>
-            <a:xfrm>
-              <a:off x="1804984" y="5190067"/>
-              <a:ext cx="5194815" cy="592666"/>
-            </a:xfrm>
-            <a:prstGeom prst="straightConnector1">
-              <a:avLst/>
-            </a:prstGeom>
-            <a:ln w="12700">
-              <a:solidFill>
-                <a:schemeClr val="bg1">
-                  <a:alpha val="60000"/>
-                </a:schemeClr>
-              </a:solidFill>
-              <a:tailEnd type="triangle"/>
-            </a:ln>
-          </p:spPr>
-          <p:style>
-            <a:lnRef idx="1">
-              <a:schemeClr val="accent1"/>
-            </a:lnRef>
-            <a:fillRef idx="0">
-              <a:schemeClr val="accent1"/>
-            </a:fillRef>
-            <a:effectRef idx="0">
-              <a:schemeClr val="accent1"/>
-            </a:effectRef>
-            <a:fontRef idx="minor">
-              <a:schemeClr val="tx1"/>
-            </a:fontRef>
-          </p:style>
-        </p:cxnSp>
-      </p:grpSp>
       <p:sp>
         <p:nvSpPr>
           <p:cNvPr id="23" name="TextBox 22"/>
@@ -7715,7 +7548,7 @@
         </p:nvSpPr>
         <p:spPr>
           <a:xfrm>
-            <a:off x="248418" y="4884722"/>
+            <a:off x="308053" y="4875603"/>
             <a:ext cx="2345642" cy="738664"/>
           </a:xfrm>
           <a:prstGeom prst="rect">
@@ -7919,7 +7752,7 @@
         </p:nvSpPr>
         <p:spPr>
           <a:xfrm>
-            <a:off x="295577" y="3629553"/>
+            <a:off x="151863" y="3594009"/>
             <a:ext cx="1657793" cy="523220"/>
           </a:xfrm>
           <a:prstGeom prst="rect">
@@ -7950,86 +7783,6 @@
           </a:p>
         </p:txBody>
       </p:sp>
-      <p:cxnSp>
-        <p:nvCxnSpPr>
-          <p:cNvPr id="11" name="Straight Arrow Connector 10"/>
-          <p:cNvCxnSpPr>
-            <a:cxnSpLocks/>
-          </p:cNvCxnSpPr>
-          <p:nvPr/>
-        </p:nvCxnSpPr>
-        <p:spPr>
-          <a:xfrm flipV="1">
-            <a:off x="1731280" y="942735"/>
-            <a:ext cx="549587" cy="589508"/>
-          </a:xfrm>
-          <a:prstGeom prst="straightConnector1">
-            <a:avLst/>
-          </a:prstGeom>
-          <a:ln w="12700">
-            <a:solidFill>
-              <a:schemeClr val="bg1">
-                <a:alpha val="60000"/>
-              </a:schemeClr>
-            </a:solidFill>
-            <a:tailEnd type="triangle"/>
-          </a:ln>
-        </p:spPr>
-        <p:style>
-          <a:lnRef idx="1">
-            <a:schemeClr val="accent1"/>
-          </a:lnRef>
-          <a:fillRef idx="0">
-            <a:schemeClr val="accent1"/>
-          </a:fillRef>
-          <a:effectRef idx="0">
-            <a:schemeClr val="accent1"/>
-          </a:effectRef>
-          <a:fontRef idx="minor">
-            <a:schemeClr val="tx1"/>
-          </a:fontRef>
-        </p:style>
-      </p:cxnSp>
-      <p:cxnSp>
-        <p:nvCxnSpPr>
-          <p:cNvPr id="12" name="Straight Arrow Connector 11"/>
-          <p:cNvCxnSpPr>
-            <a:cxnSpLocks/>
-          </p:cNvCxnSpPr>
-          <p:nvPr/>
-        </p:nvCxnSpPr>
-        <p:spPr>
-          <a:xfrm flipV="1">
-            <a:off x="1907136" y="842141"/>
-            <a:ext cx="3059147" cy="1583413"/>
-          </a:xfrm>
-          <a:prstGeom prst="straightConnector1">
-            <a:avLst/>
-          </a:prstGeom>
-          <a:ln w="12700">
-            <a:solidFill>
-              <a:schemeClr val="bg1">
-                <a:alpha val="60000"/>
-              </a:schemeClr>
-            </a:solidFill>
-            <a:tailEnd type="triangle"/>
-          </a:ln>
-        </p:spPr>
-        <p:style>
-          <a:lnRef idx="1">
-            <a:schemeClr val="accent1"/>
-          </a:lnRef>
-          <a:fillRef idx="0">
-            <a:schemeClr val="accent1"/>
-          </a:fillRef>
-          <a:effectRef idx="0">
-            <a:schemeClr val="accent1"/>
-          </a:effectRef>
-          <a:fontRef idx="minor">
-            <a:schemeClr val="tx1"/>
-          </a:fontRef>
-        </p:style>
-      </p:cxnSp>
       <p:sp>
         <p:nvSpPr>
           <p:cNvPr id="13" name="TextBox 12"/>
@@ -8038,7 +7791,7 @@
         </p:nvSpPr>
         <p:spPr>
           <a:xfrm>
-            <a:off x="211633" y="2245075"/>
+            <a:off x="148299" y="2237281"/>
             <a:ext cx="1742619" cy="307777"/>
           </a:xfrm>
           <a:prstGeom prst="rect">
@@ -8069,7 +7822,7 @@
         </p:nvSpPr>
         <p:spPr>
           <a:xfrm>
-            <a:off x="356909" y="1470339"/>
+            <a:off x="156408" y="1537806"/>
             <a:ext cx="1742619" cy="323165"/>
           </a:xfrm>
           <a:prstGeom prst="rect">
@@ -8163,360 +7916,864 @@
           </a:p>
         </p:txBody>
       </p:sp>
-      <p:grpSp>
-        <p:nvGrpSpPr>
-          <p:cNvPr id="3" name="Group 2"/>
-          <p:cNvGrpSpPr/>
-          <p:nvPr/>
-        </p:nvGrpSpPr>
-        <p:grpSpPr>
-          <a:xfrm>
-            <a:off x="1493242" y="2225557"/>
-            <a:ext cx="5694961" cy="1927216"/>
-            <a:chOff x="1481667" y="2168511"/>
-            <a:chExt cx="5751245" cy="1821254"/>
-          </a:xfrm>
-        </p:grpSpPr>
-        <p:cxnSp>
-          <p:nvCxnSpPr>
-            <p:cNvPr id="5" name="Straight Arrow Connector 4"/>
-            <p:cNvCxnSpPr>
-              <a:cxnSpLocks/>
-            </p:cNvCxnSpPr>
-            <p:nvPr/>
-          </p:nvCxnSpPr>
-          <p:spPr>
-            <a:xfrm flipV="1">
-              <a:off x="1481667" y="2273700"/>
-              <a:ext cx="1287535" cy="1451633"/>
-            </a:xfrm>
-            <a:prstGeom prst="straightConnector1">
-              <a:avLst/>
-            </a:prstGeom>
-            <a:ln w="12700">
-              <a:solidFill>
-                <a:schemeClr val="bg1">
-                  <a:alpha val="60000"/>
-                </a:schemeClr>
-              </a:solidFill>
-              <a:tailEnd type="triangle"/>
-            </a:ln>
-          </p:spPr>
-          <p:style>
-            <a:lnRef idx="1">
-              <a:schemeClr val="accent1"/>
-            </a:lnRef>
-            <a:fillRef idx="0">
-              <a:schemeClr val="accent1"/>
-            </a:fillRef>
-            <a:effectRef idx="0">
-              <a:schemeClr val="accent1"/>
-            </a:effectRef>
-            <a:fontRef idx="minor">
-              <a:schemeClr val="tx1"/>
-            </a:fontRef>
-          </p:style>
-        </p:cxnSp>
-        <p:cxnSp>
-          <p:nvCxnSpPr>
-            <p:cNvPr id="6" name="Straight Arrow Connector 5"/>
-            <p:cNvCxnSpPr>
-              <a:cxnSpLocks/>
-            </p:cNvCxnSpPr>
-            <p:nvPr/>
-          </p:nvCxnSpPr>
-          <p:spPr>
-            <a:xfrm flipV="1">
-              <a:off x="1481667" y="2168511"/>
-              <a:ext cx="5336923" cy="1556824"/>
-            </a:xfrm>
-            <a:prstGeom prst="straightConnector1">
-              <a:avLst/>
-            </a:prstGeom>
-            <a:ln w="12700">
-              <a:solidFill>
-                <a:schemeClr val="bg1">
-                  <a:alpha val="60000"/>
-                </a:schemeClr>
-              </a:solidFill>
-              <a:tailEnd type="triangle"/>
-            </a:ln>
-          </p:spPr>
-          <p:style>
-            <a:lnRef idx="1">
-              <a:schemeClr val="accent1"/>
-            </a:lnRef>
-            <a:fillRef idx="0">
-              <a:schemeClr val="accent1"/>
-            </a:fillRef>
-            <a:effectRef idx="0">
-              <a:schemeClr val="accent1"/>
-            </a:effectRef>
-            <a:fontRef idx="minor">
-              <a:schemeClr val="tx1"/>
-            </a:fontRef>
-          </p:style>
-        </p:cxnSp>
-        <p:cxnSp>
-          <p:nvCxnSpPr>
-            <p:cNvPr id="7" name="Straight Arrow Connector 6"/>
-            <p:cNvCxnSpPr>
-              <a:cxnSpLocks/>
-            </p:cNvCxnSpPr>
-            <p:nvPr/>
-          </p:nvCxnSpPr>
-          <p:spPr>
-            <a:xfrm flipV="1">
-              <a:off x="1481667" y="3549661"/>
-              <a:ext cx="5751245" cy="175673"/>
-            </a:xfrm>
-            <a:prstGeom prst="straightConnector1">
-              <a:avLst/>
-            </a:prstGeom>
-            <a:ln w="12700">
-              <a:solidFill>
-                <a:schemeClr val="bg1">
-                  <a:alpha val="60000"/>
-                </a:schemeClr>
-              </a:solidFill>
-              <a:tailEnd type="triangle"/>
-            </a:ln>
-          </p:spPr>
-          <p:style>
-            <a:lnRef idx="1">
-              <a:schemeClr val="accent1"/>
-            </a:lnRef>
-            <a:fillRef idx="0">
-              <a:schemeClr val="accent1"/>
-            </a:fillRef>
-            <a:effectRef idx="0">
-              <a:schemeClr val="accent1"/>
-            </a:effectRef>
-            <a:fontRef idx="minor">
-              <a:schemeClr val="tx1"/>
-            </a:fontRef>
-          </p:style>
-        </p:cxnSp>
-        <p:cxnSp>
-          <p:nvCxnSpPr>
-            <p:cNvPr id="8" name="Straight Arrow Connector 7"/>
-            <p:cNvCxnSpPr>
-              <a:cxnSpLocks/>
-            </p:cNvCxnSpPr>
-            <p:nvPr/>
-          </p:nvCxnSpPr>
-          <p:spPr>
-            <a:xfrm>
-              <a:off x="1481667" y="3725333"/>
-              <a:ext cx="3195224" cy="264432"/>
-            </a:xfrm>
-            <a:prstGeom prst="straightConnector1">
-              <a:avLst/>
-            </a:prstGeom>
-            <a:ln w="12700">
-              <a:solidFill>
-                <a:schemeClr val="bg1">
-                  <a:alpha val="60000"/>
-                </a:schemeClr>
-              </a:solidFill>
-              <a:tailEnd type="triangle"/>
-            </a:ln>
-          </p:spPr>
-          <p:style>
-            <a:lnRef idx="1">
-              <a:schemeClr val="accent1"/>
-            </a:lnRef>
-            <a:fillRef idx="0">
-              <a:schemeClr val="accent1"/>
-            </a:fillRef>
-            <a:effectRef idx="0">
-              <a:schemeClr val="accent1"/>
-            </a:effectRef>
-            <a:fontRef idx="minor">
-              <a:schemeClr val="tx1"/>
-            </a:fontRef>
-          </p:style>
-        </p:cxnSp>
-        <p:cxnSp>
-          <p:nvCxnSpPr>
-            <p:cNvPr id="9" name="Straight Arrow Connector 8"/>
-            <p:cNvCxnSpPr>
-              <a:cxnSpLocks/>
-            </p:cNvCxnSpPr>
-            <p:nvPr/>
-          </p:nvCxnSpPr>
-          <p:spPr>
-            <a:xfrm>
-              <a:off x="1481667" y="3725333"/>
-              <a:ext cx="612278" cy="184564"/>
-            </a:xfrm>
-            <a:prstGeom prst="straightConnector1">
-              <a:avLst/>
-            </a:prstGeom>
-            <a:ln w="12700">
-              <a:solidFill>
-                <a:schemeClr val="bg1">
-                  <a:alpha val="60000"/>
-                </a:schemeClr>
-              </a:solidFill>
-              <a:tailEnd type="triangle"/>
-            </a:ln>
-          </p:spPr>
-          <p:style>
-            <a:lnRef idx="1">
-              <a:schemeClr val="accent1"/>
-            </a:lnRef>
-            <a:fillRef idx="0">
-              <a:schemeClr val="accent1"/>
-            </a:fillRef>
-            <a:effectRef idx="0">
-              <a:schemeClr val="accent1"/>
-            </a:effectRef>
-            <a:fontRef idx="minor">
-              <a:schemeClr val="tx1"/>
-            </a:fontRef>
-          </p:style>
-        </p:cxnSp>
-      </p:grpSp>
-      <p:grpSp>
-        <p:nvGrpSpPr>
-          <p:cNvPr id="15" name="Group 14"/>
-          <p:cNvGrpSpPr/>
-          <p:nvPr/>
-        </p:nvGrpSpPr>
-        <p:grpSpPr>
-          <a:xfrm>
-            <a:off x="1907137" y="5637402"/>
-            <a:ext cx="5458398" cy="662730"/>
-            <a:chOff x="1794933" y="5190067"/>
-            <a:chExt cx="5655554" cy="665097"/>
-          </a:xfrm>
-        </p:grpSpPr>
-        <p:cxnSp>
-          <p:nvCxnSpPr>
-            <p:cNvPr id="16" name="Straight Arrow Connector 15"/>
-            <p:cNvCxnSpPr>
-              <a:cxnSpLocks/>
-            </p:cNvCxnSpPr>
-            <p:nvPr/>
-          </p:nvCxnSpPr>
-          <p:spPr>
-            <a:xfrm>
-              <a:off x="1794933" y="5190067"/>
-              <a:ext cx="202423" cy="311414"/>
-            </a:xfrm>
-            <a:prstGeom prst="straightConnector1">
-              <a:avLst/>
-            </a:prstGeom>
-            <a:ln w="12700">
-              <a:solidFill>
-                <a:schemeClr val="bg1">
-                  <a:alpha val="60000"/>
-                </a:schemeClr>
-              </a:solidFill>
-              <a:tailEnd type="triangle"/>
-            </a:ln>
-          </p:spPr>
-          <p:style>
-            <a:lnRef idx="1">
-              <a:schemeClr val="accent1"/>
-            </a:lnRef>
-            <a:fillRef idx="0">
-              <a:schemeClr val="accent1"/>
-            </a:fillRef>
-            <a:effectRef idx="0">
-              <a:schemeClr val="accent1"/>
-            </a:effectRef>
-            <a:fontRef idx="minor">
-              <a:schemeClr val="tx1"/>
-            </a:fontRef>
-          </p:style>
-        </p:cxnSp>
-        <p:cxnSp>
-          <p:nvCxnSpPr>
-            <p:cNvPr id="17" name="Straight Arrow Connector 16"/>
-            <p:cNvCxnSpPr>
-              <a:cxnSpLocks/>
-            </p:cNvCxnSpPr>
-            <p:nvPr/>
-          </p:nvCxnSpPr>
-          <p:spPr>
-            <a:xfrm>
-              <a:off x="1804984" y="5190067"/>
-              <a:ext cx="3097149" cy="599522"/>
-            </a:xfrm>
-            <a:prstGeom prst="straightConnector1">
-              <a:avLst/>
-            </a:prstGeom>
-            <a:ln w="12700">
-              <a:solidFill>
-                <a:schemeClr val="bg1">
-                  <a:alpha val="60000"/>
-                </a:schemeClr>
-              </a:solidFill>
-              <a:tailEnd type="triangle"/>
-            </a:ln>
-          </p:spPr>
-          <p:style>
-            <a:lnRef idx="1">
-              <a:schemeClr val="accent1"/>
-            </a:lnRef>
-            <a:fillRef idx="0">
-              <a:schemeClr val="accent1"/>
-            </a:fillRef>
-            <a:effectRef idx="0">
-              <a:schemeClr val="accent1"/>
-            </a:effectRef>
-            <a:fontRef idx="minor">
-              <a:schemeClr val="tx1"/>
-            </a:fontRef>
-          </p:style>
-        </p:cxnSp>
-        <p:cxnSp>
-          <p:nvCxnSpPr>
-            <p:cNvPr id="18" name="Straight Arrow Connector 17"/>
-            <p:cNvCxnSpPr>
-              <a:cxnSpLocks/>
-            </p:cNvCxnSpPr>
-            <p:nvPr/>
-          </p:nvCxnSpPr>
-          <p:spPr>
-            <a:xfrm>
-              <a:off x="1804984" y="5190067"/>
-              <a:ext cx="5645503" cy="665097"/>
-            </a:xfrm>
-            <a:prstGeom prst="straightConnector1">
-              <a:avLst/>
-            </a:prstGeom>
-            <a:ln w="12700">
-              <a:solidFill>
-                <a:schemeClr val="bg1">
-                  <a:alpha val="60000"/>
-                </a:schemeClr>
-              </a:solidFill>
-              <a:tailEnd type="triangle"/>
-            </a:ln>
-          </p:spPr>
-          <p:style>
-            <a:lnRef idx="1">
-              <a:schemeClr val="accent1"/>
-            </a:lnRef>
-            <a:fillRef idx="0">
-              <a:schemeClr val="accent1"/>
-            </a:fillRef>
-            <a:effectRef idx="0">
-              <a:schemeClr val="accent1"/>
-            </a:effectRef>
-            <a:fontRef idx="minor">
-              <a:schemeClr val="tx1"/>
-            </a:fontRef>
-          </p:style>
-        </p:cxnSp>
-      </p:grpSp>
     </p:spTree>
     <p:extLst>
       <p:ext uri="{BB962C8B-B14F-4D97-AF65-F5344CB8AC3E}">
         <p14:creationId xmlns:p14="http://schemas.microsoft.com/office/powerpoint/2010/main" val="1602321265"/>
+      </p:ext>
+    </p:extLst>
+  </p:cSld>
+  <p:clrMapOvr>
+    <a:masterClrMapping/>
+  </p:clrMapOvr>
+</p:sld>
+</file>
+
+<file path=ppt/slides/slide7.xml><?xml version="1.0" encoding="utf-8"?>
+<p:sld xmlns:a="http://schemas.openxmlformats.org/drawingml/2006/main" xmlns:r="http://schemas.openxmlformats.org/officeDocument/2006/relationships" xmlns:p="http://schemas.openxmlformats.org/presentationml/2006/main">
+  <p:cSld>
+    <p:spTree>
+      <p:nvGrpSpPr>
+        <p:cNvPr id="1" name=""/>
+        <p:cNvGrpSpPr/>
+        <p:nvPr/>
+      </p:nvGrpSpPr>
+      <p:grpSpPr>
+        <a:xfrm>
+          <a:off x="0" y="0"/>
+          <a:ext cx="0" cy="0"/>
+          <a:chOff x="0" y="0"/>
+          <a:chExt cx="0" cy="0"/>
+        </a:xfrm>
+      </p:grpSpPr>
+      <p:pic>
+        <p:nvPicPr>
+          <p:cNvPr id="7" name="Picture 6"/>
+          <p:cNvPicPr>
+            <a:picLocks noChangeAspect="1"/>
+          </p:cNvPicPr>
+          <p:nvPr/>
+        </p:nvPicPr>
+        <p:blipFill>
+          <a:blip r:embed="rId2"/>
+          <a:stretch>
+            <a:fillRect/>
+          </a:stretch>
+        </p:blipFill>
+        <p:spPr>
+          <a:xfrm>
+            <a:off x="2479130" y="0"/>
+            <a:ext cx="6156000" cy="6858000"/>
+          </a:xfrm>
+          <a:prstGeom prst="rect">
+            <a:avLst/>
+          </a:prstGeom>
+        </p:spPr>
+      </p:pic>
+      <p:sp>
+        <p:nvSpPr>
+          <p:cNvPr id="8" name="TextBox 7"/>
+          <p:cNvSpPr txBox="1"/>
+          <p:nvPr/>
+        </p:nvSpPr>
+        <p:spPr>
+          <a:xfrm>
+            <a:off x="308053" y="151430"/>
+            <a:ext cx="2538486" cy="707886"/>
+          </a:xfrm>
+          <a:prstGeom prst="rect">
+            <a:avLst/>
+          </a:prstGeom>
+          <a:noFill/>
+        </p:spPr>
+        <p:txBody>
+          <a:bodyPr wrap="square" rtlCol="0">
+            <a:spAutoFit/>
+          </a:bodyPr>
+          <a:lstStyle/>
+          <a:p>
+            <a:r>
+              <a:rPr lang="en-GB" sz="2000" dirty="0"/>
+              <a:t>Wireframe from </a:t>
+            </a:r>
+            <a:br>
+              <a:rPr lang="en-GB" sz="2000" dirty="0"/>
+            </a:br>
+            <a:r>
+              <a:rPr lang="en-GB" sz="2000" dirty="0"/>
+              <a:t>Design Spec</a:t>
+            </a:r>
+          </a:p>
+        </p:txBody>
+      </p:sp>
+      <p:sp>
+        <p:nvSpPr>
+          <p:cNvPr id="10" name="TextBox 9"/>
+          <p:cNvSpPr txBox="1"/>
+          <p:nvPr/>
+        </p:nvSpPr>
+        <p:spPr>
+          <a:xfrm>
+            <a:off x="308051" y="1477773"/>
+            <a:ext cx="1742619" cy="323165"/>
+          </a:xfrm>
+          <a:prstGeom prst="rect">
+            <a:avLst/>
+          </a:prstGeom>
+          <a:noFill/>
+        </p:spPr>
+        <p:txBody>
+          <a:bodyPr wrap="square" rtlCol="0">
+            <a:spAutoFit/>
+          </a:bodyPr>
+          <a:lstStyle/>
+          <a:p>
+            <a:r>
+              <a:rPr lang="en-GB" sz="1500" dirty="0">
+                <a:latin typeface="+mj-lt"/>
+              </a:rPr>
+              <a:t>Artbud logo</a:t>
+            </a:r>
+          </a:p>
+        </p:txBody>
+      </p:sp>
+      <p:sp>
+        <p:nvSpPr>
+          <p:cNvPr id="11" name="TextBox 10"/>
+          <p:cNvSpPr txBox="1"/>
+          <p:nvPr/>
+        </p:nvSpPr>
+        <p:spPr>
+          <a:xfrm>
+            <a:off x="308053" y="2250638"/>
+            <a:ext cx="1742619" cy="307777"/>
+          </a:xfrm>
+          <a:prstGeom prst="rect">
+            <a:avLst/>
+          </a:prstGeom>
+          <a:noFill/>
+        </p:spPr>
+        <p:txBody>
+          <a:bodyPr wrap="square" rtlCol="0">
+            <a:spAutoFit/>
+          </a:bodyPr>
+          <a:lstStyle/>
+          <a:p>
+            <a:r>
+              <a:rPr lang="en-GB" sz="1400" dirty="0">
+                <a:latin typeface="+mj-lt"/>
+              </a:rPr>
+              <a:t>Navigation bar</a:t>
+            </a:r>
+          </a:p>
+        </p:txBody>
+      </p:sp>
+      <p:sp>
+        <p:nvSpPr>
+          <p:cNvPr id="12" name="TextBox 11"/>
+          <p:cNvSpPr txBox="1"/>
+          <p:nvPr/>
+        </p:nvSpPr>
+        <p:spPr>
+          <a:xfrm>
+            <a:off x="308053" y="2940493"/>
+            <a:ext cx="1742619" cy="307777"/>
+          </a:xfrm>
+          <a:prstGeom prst="rect">
+            <a:avLst/>
+          </a:prstGeom>
+          <a:noFill/>
+        </p:spPr>
+        <p:txBody>
+          <a:bodyPr wrap="square" rtlCol="0">
+            <a:spAutoFit/>
+          </a:bodyPr>
+          <a:lstStyle/>
+          <a:p>
+            <a:r>
+              <a:rPr lang="en-GB" sz="1400" dirty="0">
+                <a:latin typeface="+mj-lt"/>
+              </a:rPr>
+              <a:t>Profile Picture</a:t>
+            </a:r>
+          </a:p>
+        </p:txBody>
+      </p:sp>
+      <p:sp>
+        <p:nvSpPr>
+          <p:cNvPr id="13" name="TextBox 12"/>
+          <p:cNvSpPr txBox="1"/>
+          <p:nvPr/>
+        </p:nvSpPr>
+        <p:spPr>
+          <a:xfrm>
+            <a:off x="308051" y="3545504"/>
+            <a:ext cx="1742619" cy="307777"/>
+          </a:xfrm>
+          <a:prstGeom prst="rect">
+            <a:avLst/>
+          </a:prstGeom>
+          <a:noFill/>
+        </p:spPr>
+        <p:txBody>
+          <a:bodyPr wrap="square" rtlCol="0">
+            <a:spAutoFit/>
+          </a:bodyPr>
+          <a:lstStyle/>
+          <a:p>
+            <a:r>
+              <a:rPr lang="en-GB" sz="1400" dirty="0">
+                <a:latin typeface="+mj-lt"/>
+              </a:rPr>
+              <a:t>Profile information </a:t>
+            </a:r>
+          </a:p>
+        </p:txBody>
+      </p:sp>
+      <p:sp>
+        <p:nvSpPr>
+          <p:cNvPr id="14" name="TextBox 13"/>
+          <p:cNvSpPr txBox="1"/>
+          <p:nvPr/>
+        </p:nvSpPr>
+        <p:spPr>
+          <a:xfrm>
+            <a:off x="308050" y="4283903"/>
+            <a:ext cx="1742619" cy="307777"/>
+          </a:xfrm>
+          <a:prstGeom prst="rect">
+            <a:avLst/>
+          </a:prstGeom>
+          <a:noFill/>
+        </p:spPr>
+        <p:txBody>
+          <a:bodyPr wrap="square" rtlCol="0">
+            <a:spAutoFit/>
+          </a:bodyPr>
+          <a:lstStyle/>
+          <a:p>
+            <a:r>
+              <a:rPr lang="en-GB" sz="1400" dirty="0">
+                <a:latin typeface="+mj-lt"/>
+              </a:rPr>
+              <a:t>All users art</a:t>
+            </a:r>
+          </a:p>
+        </p:txBody>
+      </p:sp>
+      <p:sp>
+        <p:nvSpPr>
+          <p:cNvPr id="15" name="TextBox 14"/>
+          <p:cNvSpPr txBox="1"/>
+          <p:nvPr/>
+        </p:nvSpPr>
+        <p:spPr>
+          <a:xfrm>
+            <a:off x="308052" y="5379414"/>
+            <a:ext cx="2129004" cy="738664"/>
+          </a:xfrm>
+          <a:prstGeom prst="rect">
+            <a:avLst/>
+          </a:prstGeom>
+          <a:noFill/>
+        </p:spPr>
+        <p:txBody>
+          <a:bodyPr wrap="square" rtlCol="0">
+            <a:spAutoFit/>
+          </a:bodyPr>
+          <a:lstStyle/>
+          <a:p>
+            <a:r>
+              <a:rPr lang="en-GB" sz="1400" dirty="0">
+                <a:latin typeface="+mj-lt"/>
+              </a:rPr>
+              <a:t>Footer with tweets, about section,</a:t>
+            </a:r>
+            <a:br>
+              <a:rPr lang="en-GB" sz="1400" dirty="0">
+                <a:latin typeface="+mj-lt"/>
+              </a:rPr>
+            </a:br>
+            <a:r>
+              <a:rPr lang="en-GB" sz="1400" dirty="0">
+                <a:latin typeface="+mj-lt"/>
+              </a:rPr>
+              <a:t>and contact</a:t>
+            </a:r>
+          </a:p>
+        </p:txBody>
+      </p:sp>
+    </p:spTree>
+    <p:extLst>
+      <p:ext uri="{BB962C8B-B14F-4D97-AF65-F5344CB8AC3E}">
+        <p14:creationId xmlns:p14="http://schemas.microsoft.com/office/powerpoint/2010/main" val="77363746"/>
+      </p:ext>
+    </p:extLst>
+  </p:cSld>
+  <p:clrMapOvr>
+    <a:masterClrMapping/>
+  </p:clrMapOvr>
+</p:sld>
+</file>
+
+<file path=ppt/slides/slide8.xml><?xml version="1.0" encoding="utf-8"?>
+<p:sld xmlns:a="http://schemas.openxmlformats.org/drawingml/2006/main" xmlns:r="http://schemas.openxmlformats.org/officeDocument/2006/relationships" xmlns:p="http://schemas.openxmlformats.org/presentationml/2006/main">
+  <p:cSld>
+    <p:spTree>
+      <p:nvGrpSpPr>
+        <p:cNvPr id="1" name=""/>
+        <p:cNvGrpSpPr/>
+        <p:nvPr/>
+      </p:nvGrpSpPr>
+      <p:grpSpPr>
+        <a:xfrm>
+          <a:off x="0" y="0"/>
+          <a:ext cx="0" cy="0"/>
+          <a:chOff x="0" y="0"/>
+          <a:chExt cx="0" cy="0"/>
+        </a:xfrm>
+      </p:grpSpPr>
+      <p:pic>
+        <p:nvPicPr>
+          <p:cNvPr id="5" name="Picture 4"/>
+          <p:cNvPicPr>
+            <a:picLocks noChangeAspect="1"/>
+          </p:cNvPicPr>
+          <p:nvPr/>
+        </p:nvPicPr>
+        <p:blipFill>
+          <a:blip r:embed="rId2"/>
+          <a:stretch>
+            <a:fillRect/>
+          </a:stretch>
+        </p:blipFill>
+        <p:spPr>
+          <a:xfrm>
+            <a:off x="2194513" y="0"/>
+            <a:ext cx="6714377" cy="6858000"/>
+          </a:xfrm>
+          <a:prstGeom prst="rect">
+            <a:avLst/>
+          </a:prstGeom>
+        </p:spPr>
+      </p:pic>
+      <p:sp>
+        <p:nvSpPr>
+          <p:cNvPr id="6" name="TextBox 5"/>
+          <p:cNvSpPr txBox="1"/>
+          <p:nvPr/>
+        </p:nvSpPr>
+        <p:spPr>
+          <a:xfrm>
+            <a:off x="101643" y="148827"/>
+            <a:ext cx="2229444" cy="646331"/>
+          </a:xfrm>
+          <a:prstGeom prst="rect">
+            <a:avLst/>
+          </a:prstGeom>
+          <a:noFill/>
+        </p:spPr>
+        <p:txBody>
+          <a:bodyPr wrap="square" rtlCol="0">
+            <a:spAutoFit/>
+          </a:bodyPr>
+          <a:lstStyle/>
+          <a:p>
+            <a:r>
+              <a:rPr lang="en-GB" dirty="0"/>
+              <a:t>Profile page from app</a:t>
+            </a:r>
+          </a:p>
+        </p:txBody>
+      </p:sp>
+      <p:sp>
+        <p:nvSpPr>
+          <p:cNvPr id="7" name="TextBox 6"/>
+          <p:cNvSpPr txBox="1"/>
+          <p:nvPr/>
+        </p:nvSpPr>
+        <p:spPr>
+          <a:xfrm>
+            <a:off x="211632" y="1488250"/>
+            <a:ext cx="1742619" cy="323165"/>
+          </a:xfrm>
+          <a:prstGeom prst="rect">
+            <a:avLst/>
+          </a:prstGeom>
+          <a:noFill/>
+        </p:spPr>
+        <p:txBody>
+          <a:bodyPr wrap="square" rtlCol="0">
+            <a:spAutoFit/>
+          </a:bodyPr>
+          <a:lstStyle/>
+          <a:p>
+            <a:r>
+              <a:rPr lang="en-GB" sz="1500" dirty="0">
+                <a:latin typeface="+mj-lt"/>
+              </a:rPr>
+              <a:t>Artbud logo</a:t>
+            </a:r>
+          </a:p>
+        </p:txBody>
+      </p:sp>
+      <p:sp>
+        <p:nvSpPr>
+          <p:cNvPr id="8" name="TextBox 7"/>
+          <p:cNvSpPr txBox="1"/>
+          <p:nvPr/>
+        </p:nvSpPr>
+        <p:spPr>
+          <a:xfrm>
+            <a:off x="211633" y="2245075"/>
+            <a:ext cx="1742619" cy="307777"/>
+          </a:xfrm>
+          <a:prstGeom prst="rect">
+            <a:avLst/>
+          </a:prstGeom>
+          <a:noFill/>
+        </p:spPr>
+        <p:txBody>
+          <a:bodyPr wrap="square" rtlCol="0">
+            <a:spAutoFit/>
+          </a:bodyPr>
+          <a:lstStyle/>
+          <a:p>
+            <a:r>
+              <a:rPr lang="en-GB" sz="1400" dirty="0">
+                <a:latin typeface="+mj-lt"/>
+              </a:rPr>
+              <a:t>Navigation bar</a:t>
+            </a:r>
+          </a:p>
+        </p:txBody>
+      </p:sp>
+      <p:sp>
+        <p:nvSpPr>
+          <p:cNvPr id="9" name="TextBox 8"/>
+          <p:cNvSpPr txBox="1"/>
+          <p:nvPr/>
+        </p:nvSpPr>
+        <p:spPr>
+          <a:xfrm>
+            <a:off x="211629" y="5309391"/>
+            <a:ext cx="2129004" cy="738664"/>
+          </a:xfrm>
+          <a:prstGeom prst="rect">
+            <a:avLst/>
+          </a:prstGeom>
+          <a:noFill/>
+        </p:spPr>
+        <p:txBody>
+          <a:bodyPr wrap="square" rtlCol="0">
+            <a:spAutoFit/>
+          </a:bodyPr>
+          <a:lstStyle/>
+          <a:p>
+            <a:r>
+              <a:rPr lang="en-GB" sz="1400" dirty="0">
+                <a:latin typeface="+mj-lt"/>
+              </a:rPr>
+              <a:t>Footer with tweets, about section,</a:t>
+            </a:r>
+            <a:br>
+              <a:rPr lang="en-GB" sz="1400" dirty="0">
+                <a:latin typeface="+mj-lt"/>
+              </a:rPr>
+            </a:br>
+            <a:r>
+              <a:rPr lang="en-GB" sz="1400" dirty="0">
+                <a:latin typeface="+mj-lt"/>
+              </a:rPr>
+              <a:t>and contact</a:t>
+            </a:r>
+          </a:p>
+        </p:txBody>
+      </p:sp>
+      <p:sp>
+        <p:nvSpPr>
+          <p:cNvPr id="10" name="TextBox 9"/>
+          <p:cNvSpPr txBox="1"/>
+          <p:nvPr/>
+        </p:nvSpPr>
+        <p:spPr>
+          <a:xfrm>
+            <a:off x="211631" y="2960993"/>
+            <a:ext cx="1742619" cy="307777"/>
+          </a:xfrm>
+          <a:prstGeom prst="rect">
+            <a:avLst/>
+          </a:prstGeom>
+          <a:noFill/>
+        </p:spPr>
+        <p:txBody>
+          <a:bodyPr wrap="square" rtlCol="0">
+            <a:spAutoFit/>
+          </a:bodyPr>
+          <a:lstStyle/>
+          <a:p>
+            <a:r>
+              <a:rPr lang="en-GB" sz="1400" dirty="0">
+                <a:latin typeface="+mj-lt"/>
+              </a:rPr>
+              <a:t>Profile Picture</a:t>
+            </a:r>
+          </a:p>
+        </p:txBody>
+      </p:sp>
+      <p:sp>
+        <p:nvSpPr>
+          <p:cNvPr id="11" name="TextBox 10"/>
+          <p:cNvSpPr txBox="1"/>
+          <p:nvPr/>
+        </p:nvSpPr>
+        <p:spPr>
+          <a:xfrm>
+            <a:off x="211630" y="3523022"/>
+            <a:ext cx="1742619" cy="307777"/>
+          </a:xfrm>
+          <a:prstGeom prst="rect">
+            <a:avLst/>
+          </a:prstGeom>
+          <a:noFill/>
+        </p:spPr>
+        <p:txBody>
+          <a:bodyPr wrap="square" rtlCol="0">
+            <a:spAutoFit/>
+          </a:bodyPr>
+          <a:lstStyle/>
+          <a:p>
+            <a:r>
+              <a:rPr lang="en-GB" sz="1400" dirty="0">
+                <a:latin typeface="+mj-lt"/>
+              </a:rPr>
+              <a:t>Profile information </a:t>
+            </a:r>
+          </a:p>
+        </p:txBody>
+      </p:sp>
+      <p:sp>
+        <p:nvSpPr>
+          <p:cNvPr id="12" name="TextBox 11"/>
+          <p:cNvSpPr txBox="1"/>
+          <p:nvPr/>
+        </p:nvSpPr>
+        <p:spPr>
+          <a:xfrm>
+            <a:off x="211629" y="4293134"/>
+            <a:ext cx="1742619" cy="307777"/>
+          </a:xfrm>
+          <a:prstGeom prst="rect">
+            <a:avLst/>
+          </a:prstGeom>
+          <a:noFill/>
+        </p:spPr>
+        <p:txBody>
+          <a:bodyPr wrap="square" rtlCol="0">
+            <a:spAutoFit/>
+          </a:bodyPr>
+          <a:lstStyle/>
+          <a:p>
+            <a:r>
+              <a:rPr lang="en-GB" sz="1400" dirty="0">
+                <a:latin typeface="+mj-lt"/>
+              </a:rPr>
+              <a:t>All users art</a:t>
+            </a:r>
+          </a:p>
+        </p:txBody>
+      </p:sp>
+    </p:spTree>
+    <p:extLst>
+      <p:ext uri="{BB962C8B-B14F-4D97-AF65-F5344CB8AC3E}">
+        <p14:creationId xmlns:p14="http://schemas.microsoft.com/office/powerpoint/2010/main" val="1094043328"/>
+      </p:ext>
+    </p:extLst>
+  </p:cSld>
+  <p:clrMapOvr>
+    <a:masterClrMapping/>
+  </p:clrMapOvr>
+</p:sld>
+</file>
+
+<file path=ppt/slides/slide9.xml><?xml version="1.0" encoding="utf-8"?>
+<p:sld xmlns:a="http://schemas.openxmlformats.org/drawingml/2006/main" xmlns:r="http://schemas.openxmlformats.org/officeDocument/2006/relationships" xmlns:p="http://schemas.openxmlformats.org/presentationml/2006/main">
+  <p:cSld>
+    <p:spTree>
+      <p:nvGrpSpPr>
+        <p:cNvPr id="1" name=""/>
+        <p:cNvGrpSpPr/>
+        <p:nvPr/>
+      </p:nvGrpSpPr>
+      <p:grpSpPr>
+        <a:xfrm>
+          <a:off x="0" y="0"/>
+          <a:ext cx="0" cy="0"/>
+          <a:chOff x="0" y="0"/>
+          <a:chExt cx="0" cy="0"/>
+        </a:xfrm>
+      </p:grpSpPr>
+      <p:pic>
+        <p:nvPicPr>
+          <p:cNvPr id="4" name="Picture 3"/>
+          <p:cNvPicPr>
+            <a:picLocks noChangeAspect="1"/>
+          </p:cNvPicPr>
+          <p:nvPr/>
+        </p:nvPicPr>
+        <p:blipFill>
+          <a:blip r:embed="rId2"/>
+          <a:stretch>
+            <a:fillRect/>
+          </a:stretch>
+        </p:blipFill>
+        <p:spPr>
+          <a:xfrm>
+            <a:off x="2544402" y="0"/>
+            <a:ext cx="6126718" cy="6858000"/>
+          </a:xfrm>
+          <a:prstGeom prst="rect">
+            <a:avLst/>
+          </a:prstGeom>
+        </p:spPr>
+      </p:pic>
+      <p:sp>
+        <p:nvSpPr>
+          <p:cNvPr id="5" name="TextBox 4"/>
+          <p:cNvSpPr txBox="1"/>
+          <p:nvPr/>
+        </p:nvSpPr>
+        <p:spPr>
+          <a:xfrm>
+            <a:off x="308053" y="151430"/>
+            <a:ext cx="2538486" cy="707886"/>
+          </a:xfrm>
+          <a:prstGeom prst="rect">
+            <a:avLst/>
+          </a:prstGeom>
+          <a:noFill/>
+        </p:spPr>
+        <p:txBody>
+          <a:bodyPr wrap="square" rtlCol="0">
+            <a:spAutoFit/>
+          </a:bodyPr>
+          <a:lstStyle/>
+          <a:p>
+            <a:r>
+              <a:rPr lang="en-GB" sz="2000" dirty="0"/>
+              <a:t>Wireframe from </a:t>
+            </a:r>
+            <a:br>
+              <a:rPr lang="en-GB" sz="2000" dirty="0"/>
+            </a:br>
+            <a:r>
+              <a:rPr lang="en-GB" sz="2000" dirty="0"/>
+              <a:t>Design Spec</a:t>
+            </a:r>
+          </a:p>
+        </p:txBody>
+      </p:sp>
+      <p:sp>
+        <p:nvSpPr>
+          <p:cNvPr id="6" name="TextBox 5"/>
+          <p:cNvSpPr txBox="1"/>
+          <p:nvPr/>
+        </p:nvSpPr>
+        <p:spPr>
+          <a:xfrm>
+            <a:off x="211633" y="1470339"/>
+            <a:ext cx="1742619" cy="323165"/>
+          </a:xfrm>
+          <a:prstGeom prst="rect">
+            <a:avLst/>
+          </a:prstGeom>
+          <a:noFill/>
+        </p:spPr>
+        <p:txBody>
+          <a:bodyPr wrap="square" rtlCol="0">
+            <a:spAutoFit/>
+          </a:bodyPr>
+          <a:lstStyle/>
+          <a:p>
+            <a:r>
+              <a:rPr lang="en-GB" sz="1500" dirty="0">
+                <a:latin typeface="+mj-lt"/>
+              </a:rPr>
+              <a:t>Artbud logo</a:t>
+            </a:r>
+          </a:p>
+        </p:txBody>
+      </p:sp>
+      <p:sp>
+        <p:nvSpPr>
+          <p:cNvPr id="7" name="TextBox 6"/>
+          <p:cNvSpPr txBox="1"/>
+          <p:nvPr/>
+        </p:nvSpPr>
+        <p:spPr>
+          <a:xfrm>
+            <a:off x="211627" y="2639239"/>
+            <a:ext cx="1742619" cy="307777"/>
+          </a:xfrm>
+          <a:prstGeom prst="rect">
+            <a:avLst/>
+          </a:prstGeom>
+          <a:noFill/>
+        </p:spPr>
+        <p:txBody>
+          <a:bodyPr wrap="square" rtlCol="0">
+            <a:spAutoFit/>
+          </a:bodyPr>
+          <a:lstStyle/>
+          <a:p>
+            <a:r>
+              <a:rPr lang="en-GB" sz="1400" dirty="0">
+                <a:latin typeface="+mj-lt"/>
+              </a:rPr>
+              <a:t>Search bar</a:t>
+            </a:r>
+          </a:p>
+        </p:txBody>
+      </p:sp>
+      <p:sp>
+        <p:nvSpPr>
+          <p:cNvPr id="8" name="TextBox 7"/>
+          <p:cNvSpPr txBox="1"/>
+          <p:nvPr/>
+        </p:nvSpPr>
+        <p:spPr>
+          <a:xfrm>
+            <a:off x="211633" y="5371025"/>
+            <a:ext cx="2129004" cy="738664"/>
+          </a:xfrm>
+          <a:prstGeom prst="rect">
+            <a:avLst/>
+          </a:prstGeom>
+          <a:noFill/>
+        </p:spPr>
+        <p:txBody>
+          <a:bodyPr wrap="square" rtlCol="0">
+            <a:spAutoFit/>
+          </a:bodyPr>
+          <a:lstStyle/>
+          <a:p>
+            <a:r>
+              <a:rPr lang="en-GB" sz="1400" dirty="0">
+                <a:latin typeface="+mj-lt"/>
+              </a:rPr>
+              <a:t>Footer with tweets, about section,</a:t>
+            </a:r>
+            <a:br>
+              <a:rPr lang="en-GB" sz="1400" dirty="0">
+                <a:latin typeface="+mj-lt"/>
+              </a:rPr>
+            </a:br>
+            <a:r>
+              <a:rPr lang="en-GB" sz="1400" dirty="0">
+                <a:latin typeface="+mj-lt"/>
+              </a:rPr>
+              <a:t>and contact</a:t>
+            </a:r>
+          </a:p>
+        </p:txBody>
+      </p:sp>
+      <p:sp>
+        <p:nvSpPr>
+          <p:cNvPr id="9" name="TextBox 8"/>
+          <p:cNvSpPr txBox="1"/>
+          <p:nvPr/>
+        </p:nvSpPr>
+        <p:spPr>
+          <a:xfrm>
+            <a:off x="211628" y="3246728"/>
+            <a:ext cx="1742619" cy="523220"/>
+          </a:xfrm>
+          <a:prstGeom prst="rect">
+            <a:avLst/>
+          </a:prstGeom>
+          <a:noFill/>
+        </p:spPr>
+        <p:txBody>
+          <a:bodyPr wrap="square" rtlCol="0">
+            <a:spAutoFit/>
+          </a:bodyPr>
+          <a:lstStyle/>
+          <a:p>
+            <a:r>
+              <a:rPr lang="en-GB" sz="1400" dirty="0">
+                <a:latin typeface="+mj-lt"/>
+              </a:rPr>
+              <a:t>Main Page Picture</a:t>
+            </a:r>
+          </a:p>
+        </p:txBody>
+      </p:sp>
+      <p:sp>
+        <p:nvSpPr>
+          <p:cNvPr id="10" name="TextBox 9"/>
+          <p:cNvSpPr txBox="1"/>
+          <p:nvPr/>
+        </p:nvSpPr>
+        <p:spPr>
+          <a:xfrm>
+            <a:off x="211629" y="4369372"/>
+            <a:ext cx="1742619" cy="307777"/>
+          </a:xfrm>
+          <a:prstGeom prst="rect">
+            <a:avLst/>
+          </a:prstGeom>
+          <a:noFill/>
+        </p:spPr>
+        <p:txBody>
+          <a:bodyPr wrap="square" rtlCol="0">
+            <a:spAutoFit/>
+          </a:bodyPr>
+          <a:lstStyle/>
+          <a:p>
+            <a:r>
+              <a:rPr lang="en-GB" sz="1400" dirty="0">
+                <a:latin typeface="+mj-lt"/>
+              </a:rPr>
+              <a:t>Best and New Art</a:t>
+            </a:r>
+          </a:p>
+        </p:txBody>
+      </p:sp>
+      <p:sp>
+        <p:nvSpPr>
+          <p:cNvPr id="12" name="TextBox 11"/>
+          <p:cNvSpPr txBox="1"/>
+          <p:nvPr/>
+        </p:nvSpPr>
+        <p:spPr>
+          <a:xfrm>
+            <a:off x="211627" y="2063953"/>
+            <a:ext cx="1742619" cy="307777"/>
+          </a:xfrm>
+          <a:prstGeom prst="rect">
+            <a:avLst/>
+          </a:prstGeom>
+          <a:noFill/>
+        </p:spPr>
+        <p:txBody>
+          <a:bodyPr wrap="square" rtlCol="0">
+            <a:spAutoFit/>
+          </a:bodyPr>
+          <a:lstStyle/>
+          <a:p>
+            <a:r>
+              <a:rPr lang="en-GB" sz="1400" dirty="0">
+                <a:latin typeface="+mj-lt"/>
+              </a:rPr>
+              <a:t>Navigation bar</a:t>
+            </a:r>
+          </a:p>
+        </p:txBody>
+      </p:sp>
+    </p:spTree>
+    <p:extLst>
+      <p:ext uri="{BB962C8B-B14F-4D97-AF65-F5344CB8AC3E}">
+        <p14:creationId xmlns:p14="http://schemas.microsoft.com/office/powerpoint/2010/main" val="1351903483"/>
       </p:ext>
     </p:extLst>
   </p:cSld>

</xml_diff>

<commit_message>
Moved text on artwork pages to the left
</commit_message>
<xml_diff>
--- a/presentation_material/powerpoint.pptx
+++ b/presentation_material/powerpoint.pptx
@@ -15,6 +15,7 @@
     <p:sldId id="266" r:id="rId9"/>
     <p:sldId id="265" r:id="rId10"/>
     <p:sldId id="267" r:id="rId11"/>
+    <p:sldId id="268" r:id="rId12"/>
   </p:sldIdLst>
   <p:sldSz cx="9144000" cy="6858000" type="screen4x3"/>
   <p:notesSz cx="6858000" cy="9144000"/>
@@ -115,16 +116,16 @@
   </p:defaultTextStyle>
   <p:extLst>
     <p:ext uri="{EFAFB233-063F-42B5-8137-9DF3F51BA10A}">
-      <p15:sldGuideLst xmlns:p15="http://schemas.microsoft.com/office/powerpoint/2012/main"/>
+      <p15:sldGuideLst xmlns:p15="http://schemas.microsoft.com/office/powerpoint/2012/main" xmlns=""/>
     </p:ext>
   </p:extLst>
 </p:presentation>
 </file>
 
 <file path=ppt/charts/chart1.xml><?xml version="1.0" encoding="utf-8"?>
-<c:chartSpace xmlns:c="http://schemas.openxmlformats.org/drawingml/2006/chart" xmlns:a="http://schemas.openxmlformats.org/drawingml/2006/main" xmlns:r="http://schemas.openxmlformats.org/officeDocument/2006/relationships" xmlns:c16r2="http://schemas.microsoft.com/office/drawing/2015/06/chart">
+<c:chartSpace xmlns:c="http://schemas.openxmlformats.org/drawingml/2006/chart" xmlns:a="http://schemas.openxmlformats.org/drawingml/2006/main" xmlns:r="http://schemas.openxmlformats.org/officeDocument/2006/relationships">
   <c:date1904 val="0"/>
-  <c:lang val="en-US"/>
+  <c:lang val="en-GB"/>
   <c:roundedCorners val="0"/>
   <mc:AlternateContent xmlns:mc="http://schemas.openxmlformats.org/markup-compatibility/2006">
     <mc:Choice xmlns:c14="http://schemas.microsoft.com/office/drawing/2007/8/2/chart" Requires="c14">
@@ -161,6 +162,7 @@
           </a:p>
         </c:rich>
       </c:tx>
+      <c:layout/>
       <c:overlay val="0"/>
       <c:spPr>
         <a:noFill/>
@@ -169,26 +171,6 @@
         </a:ln>
         <a:effectLst/>
       </c:spPr>
-      <c:txPr>
-        <a:bodyPr rot="0" spcFirstLastPara="1" vertOverflow="ellipsis" vert="horz" wrap="square" anchor="ctr" anchorCtr="1"/>
-        <a:lstStyle/>
-        <a:p>
-          <a:pPr>
-            <a:defRPr sz="1862" b="0" i="0" u="none" strike="noStrike" kern="1200" spc="0" baseline="0">
-              <a:solidFill>
-                <a:schemeClr val="tx1">
-                  <a:lumMod val="65000"/>
-                  <a:lumOff val="35000"/>
-                </a:schemeClr>
-              </a:solidFill>
-              <a:latin typeface="+mn-lt"/>
-              <a:ea typeface="+mn-ea"/>
-              <a:cs typeface="+mn-cs"/>
-            </a:defRPr>
-          </a:pPr>
-          <a:endParaRPr lang="en-US"/>
-        </a:p>
-      </c:txPr>
     </c:title>
     <c:autoTitleDeleted val="0"/>
     <c:view3D>
@@ -196,6 +178,7 @@
       <c:rotY val="0"/>
       <c:depthPercent val="100"/>
       <c:rAngAx val="0"/>
+      <c:perspective val="30"/>
     </c:view3D>
     <c:floor>
       <c:thickness val="0"/>
@@ -259,7 +242,7 @@
                 </a:contourClr>
               </a:sp3d>
             </c:spPr>
-            <c:extLst>
+            <c:extLst xmlns:c16r2="http://schemas.microsoft.com/office/drawing/2015/06/chart">
               <c:ext xmlns:c16="http://schemas.microsoft.com/office/drawing/2014/chart" uri="{C3380CC4-5D6E-409C-BE32-E72D297353CC}">
                 <c16:uniqueId val="{00000001-525C-4E22-AEBE-6DEE0FE439E9}"/>
               </c:ext>
@@ -286,7 +269,7 @@
                 </a:contourClr>
               </a:sp3d>
             </c:spPr>
-            <c:extLst>
+            <c:extLst xmlns:c16r2="http://schemas.microsoft.com/office/drawing/2015/06/chart">
               <c:ext xmlns:c16="http://schemas.microsoft.com/office/drawing/2014/chart" uri="{C3380CC4-5D6E-409C-BE32-E72D297353CC}">
                 <c16:uniqueId val="{00000003-525C-4E22-AEBE-6DEE0FE439E9}"/>
               </c:ext>
@@ -311,7 +294,7 @@
                 </a:contourClr>
               </a:sp3d>
             </c:spPr>
-            <c:extLst>
+            <c:extLst xmlns:c16r2="http://schemas.microsoft.com/office/drawing/2015/06/chart">
               <c:ext xmlns:c16="http://schemas.microsoft.com/office/drawing/2014/chart" uri="{C3380CC4-5D6E-409C-BE32-E72D297353CC}">
                 <c16:uniqueId val="{00000005-525C-4E22-AEBE-6DEE0FE439E9}"/>
               </c:ext>
@@ -369,7 +352,7 @@
                 <a:effectLst/>
               </c:spPr>
             </c:leaderLines>
-            <c:extLst>
+            <c:extLst xmlns:c16r2="http://schemas.microsoft.com/office/drawing/2015/06/chart">
               <c:ext xmlns:c15="http://schemas.microsoft.com/office/drawing/2012/chart" uri="{CE6537A1-D6FC-4f65-9D91-7224C49458BB}"/>
             </c:extLst>
           </c:dLbls>
@@ -408,7 +391,7 @@
               </c:numCache>
             </c:numRef>
           </c:val>
-          <c:extLst>
+          <c:extLst xmlns:c16r2="http://schemas.microsoft.com/office/drawing/2015/06/chart">
             <c:ext xmlns:c16="http://schemas.microsoft.com/office/drawing/2014/chart" uri="{C3380CC4-5D6E-409C-BE32-E72D297353CC}">
               <c16:uniqueId val="{00000006-525C-4E22-AEBE-6DEE0FE439E9}"/>
             </c:ext>
@@ -504,6 +487,7 @@
           </a:p>
         </c:txPr>
       </c:legendEntry>
+      <c:layout/>
       <c:overlay val="0"/>
       <c:spPr>
         <a:noFill/>
@@ -554,7 +538,7 @@
       <a:endParaRPr lang="en-US"/>
     </a:p>
   </c:txPr>
-  <c:externalData r:id="rId3">
+  <c:externalData r:id="rId1">
     <c:autoUpdate val="0"/>
   </c:externalData>
 </c:chartSpace>
@@ -7041,6 +7025,97 @@
 </p:sld>
 </file>
 
+<file path=ppt/slides/slide11.xml><?xml version="1.0" encoding="utf-8"?>
+<p:sld xmlns:a="http://schemas.openxmlformats.org/drawingml/2006/main" xmlns:r="http://schemas.openxmlformats.org/officeDocument/2006/relationships" xmlns:p="http://schemas.openxmlformats.org/presentationml/2006/main">
+  <p:cSld>
+    <p:spTree>
+      <p:nvGrpSpPr>
+        <p:cNvPr id="1" name=""/>
+        <p:cNvGrpSpPr/>
+        <p:nvPr/>
+      </p:nvGrpSpPr>
+      <p:grpSpPr>
+        <a:xfrm>
+          <a:off x="0" y="0"/>
+          <a:ext cx="0" cy="0"/>
+          <a:chOff x="0" y="0"/>
+          <a:chExt cx="0" cy="0"/>
+        </a:xfrm>
+      </p:grpSpPr>
+      <p:sp>
+        <p:nvSpPr>
+          <p:cNvPr id="2" name="Title 1"/>
+          <p:cNvSpPr>
+            <a:spLocks noGrp="1"/>
+          </p:cNvSpPr>
+          <p:nvPr>
+            <p:ph type="title"/>
+          </p:nvPr>
+        </p:nvSpPr>
+        <p:spPr>
+          <a:xfrm>
+            <a:off x="459259" y="368643"/>
+            <a:ext cx="6554867" cy="1524000"/>
+          </a:xfrm>
+        </p:spPr>
+        <p:txBody>
+          <a:bodyPr/>
+          <a:lstStyle/>
+          <a:p>
+            <a:r>
+              <a:rPr lang="en-GB" dirty="0" smtClean="0"/>
+              <a:t>Issues we faced</a:t>
+            </a:r>
+            <a:endParaRPr lang="en-GB" dirty="0"/>
+          </a:p>
+        </p:txBody>
+      </p:sp>
+      <p:sp>
+        <p:nvSpPr>
+          <p:cNvPr id="3" name="Content Placeholder 2"/>
+          <p:cNvSpPr>
+            <a:spLocks noGrp="1"/>
+          </p:cNvSpPr>
+          <p:nvPr>
+            <p:ph idx="1"/>
+          </p:nvPr>
+        </p:nvSpPr>
+        <p:spPr>
+          <a:xfrm>
+            <a:off x="446903" y="2164492"/>
+            <a:ext cx="6554867" cy="3767670"/>
+          </a:xfrm>
+        </p:spPr>
+        <p:txBody>
+          <a:bodyPr/>
+          <a:lstStyle/>
+          <a:p>
+            <a:r>
+              <a:rPr lang="en-GB" dirty="0" smtClean="0"/>
+              <a:t>Getting artwork to display in correct categories.</a:t>
+            </a:r>
+          </a:p>
+          <a:p>
+            <a:r>
+              <a:rPr lang="en-GB" dirty="0" smtClean="0"/>
+              <a:t>Being able to delete other peoples’ artwork.</a:t>
+            </a:r>
+          </a:p>
+        </p:txBody>
+      </p:sp>
+    </p:spTree>
+    <p:extLst>
+      <p:ext uri="{BB962C8B-B14F-4D97-AF65-F5344CB8AC3E}">
+        <p14:creationId xmlns:p14="http://schemas.microsoft.com/office/powerpoint/2010/main" val="3013873189"/>
+      </p:ext>
+    </p:extLst>
+  </p:cSld>
+  <p:clrMapOvr>
+    <a:masterClrMapping/>
+  </p:clrMapOvr>
+</p:sld>
+</file>
+
 <file path=ppt/slides/slide2.xml><?xml version="1.0" encoding="utf-8"?>
 <p:sld xmlns:a="http://schemas.openxmlformats.org/drawingml/2006/main" xmlns:r="http://schemas.openxmlformats.org/officeDocument/2006/relationships" xmlns:p="http://schemas.openxmlformats.org/presentationml/2006/main">
   <p:cSld>
@@ -9051,7 +9126,7 @@
   <a:extraClrSchemeLst/>
   <a:extLst>
     <a:ext uri="{05A4C25C-085E-4340-85A3-A5531E510DB2}">
-      <thm15:themeFamily xmlns:thm15="http://schemas.microsoft.com/office/thememl/2012/main" name="Slice" id="{0507925B-6AC9-4358-8E18-C330545D08F8}" vid="{13FEC7C6-62A9-40C4-99D2-581AACACAA2F}"/>
+      <thm15:themeFamily xmlns:thm15="http://schemas.microsoft.com/office/thememl/2012/main" xmlns="" name="Slice" id="{0507925B-6AC9-4358-8E18-C330545D08F8}" vid="{13FEC7C6-62A9-40C4-99D2-581AACACAA2F}"/>
     </a:ext>
   </a:extLst>
 </a:theme>

</xml_diff>